<commit_message>
added more samples, presentation improvements
</commit_message>
<xml_diff>
--- a/Presentation/WPF_Unleased_4-5-21.pptx
+++ b/Presentation/WPF_Unleased_4-5-21.pptx
@@ -5,10 +5,10 @@
     <p:sldMasterId id="2147483753" r:id="rId1"/>
   </p:sldMasterIdLst>
   <p:notesMasterIdLst>
-    <p:notesMasterId r:id="rId13"/>
+    <p:notesMasterId r:id="rId19"/>
   </p:notesMasterIdLst>
   <p:handoutMasterIdLst>
-    <p:handoutMasterId r:id="rId14"/>
+    <p:handoutMasterId r:id="rId20"/>
   </p:handoutMasterIdLst>
   <p:sldIdLst>
     <p:sldId id="256" r:id="rId2"/>
@@ -22,6 +22,12 @@
     <p:sldId id="265" r:id="rId10"/>
     <p:sldId id="266" r:id="rId11"/>
     <p:sldId id="267" r:id="rId12"/>
+    <p:sldId id="268" r:id="rId13"/>
+    <p:sldId id="269" r:id="rId14"/>
+    <p:sldId id="270" r:id="rId15"/>
+    <p:sldId id="271" r:id="rId16"/>
+    <p:sldId id="272" r:id="rId17"/>
+    <p:sldId id="273" r:id="rId18"/>
   </p:sldIdLst>
   <p:sldSz cx="12192000" cy="6858000"/>
   <p:notesSz cx="6858000" cy="9144000"/>
@@ -120,6 +126,11 @@
       </a:defRPr>
     </a:lvl9pPr>
   </p:defaultTextStyle>
+  <p:extLst>
+    <p:ext uri="{EFAFB233-063F-42B5-8137-9DF3F51BA10A}">
+      <p15:sldGuideLst xmlns:p15="http://schemas.microsoft.com/office/powerpoint/2012/main"/>
+    </p:ext>
+  </p:extLst>
 </p:presentation>
 </file>
 
@@ -209,7 +220,7 @@
           <a:p>
             <a:fld id="{39598F69-59F6-41B5-B3D8-F13AA0B529E1}" type="datetimeFigureOut">
               <a:rPr lang="en-US" smtClean="0"/>
-              <a:t>5/4/2014</a:t>
+              <a:t>5/10/2014</a:t>
             </a:fld>
             <a:endParaRPr lang="en-US"/>
           </a:p>
@@ -379,7 +390,7 @@
           <a:p>
             <a:fld id="{59A41069-E7DB-4A91-87A9-B1F06FCFDAA9}" type="datetimeFigureOut">
               <a:rPr lang="en-US" smtClean="0"/>
-              <a:t>5/4/2014</a:t>
+              <a:t>5/10/2014</a:t>
             </a:fld>
             <a:endParaRPr lang="en-US"/>
           </a:p>
@@ -900,6 +911,510 @@
 </p:notes>
 </file>
 
+<file path=ppt/notesSlides/notesSlide12.xml><?xml version="1.0" encoding="utf-8"?>
+<p:notes xmlns:a="http://schemas.openxmlformats.org/drawingml/2006/main" xmlns:r="http://schemas.openxmlformats.org/officeDocument/2006/relationships" xmlns:p="http://schemas.openxmlformats.org/presentationml/2006/main">
+  <p:cSld>
+    <p:spTree>
+      <p:nvGrpSpPr>
+        <p:cNvPr id="1" name=""/>
+        <p:cNvGrpSpPr/>
+        <p:nvPr/>
+      </p:nvGrpSpPr>
+      <p:grpSpPr>
+        <a:xfrm>
+          <a:off x="0" y="0"/>
+          <a:ext cx="0" cy="0"/>
+          <a:chOff x="0" y="0"/>
+          <a:chExt cx="0" cy="0"/>
+        </a:xfrm>
+      </p:grpSpPr>
+      <p:sp>
+        <p:nvSpPr>
+          <p:cNvPr id="2" name="Slide Image Placeholder 1"/>
+          <p:cNvSpPr>
+            <a:spLocks noGrp="1" noRot="1" noChangeAspect="1"/>
+          </p:cNvSpPr>
+          <p:nvPr>
+            <p:ph type="sldImg"/>
+          </p:nvPr>
+        </p:nvSpPr>
+        <p:spPr/>
+      </p:sp>
+      <p:sp>
+        <p:nvSpPr>
+          <p:cNvPr id="3" name="Notes Placeholder 2"/>
+          <p:cNvSpPr>
+            <a:spLocks noGrp="1"/>
+          </p:cNvSpPr>
+          <p:nvPr>
+            <p:ph type="body" idx="1"/>
+          </p:nvPr>
+        </p:nvSpPr>
+        <p:spPr/>
+        <p:txBody>
+          <a:bodyPr/>
+          <a:lstStyle/>
+          <a:p>
+            <a:endParaRPr lang="en-US"/>
+          </a:p>
+        </p:txBody>
+      </p:sp>
+      <p:sp>
+        <p:nvSpPr>
+          <p:cNvPr id="4" name="Slide Number Placeholder 3"/>
+          <p:cNvSpPr>
+            <a:spLocks noGrp="1"/>
+          </p:cNvSpPr>
+          <p:nvPr>
+            <p:ph type="sldNum" sz="quarter" idx="10"/>
+          </p:nvPr>
+        </p:nvSpPr>
+        <p:spPr/>
+        <p:txBody>
+          <a:bodyPr/>
+          <a:lstStyle/>
+          <a:p>
+            <a:fld id="{FB37B091-7683-437D-AE5F-4E47E2ADEDA2}" type="slidenum">
+              <a:rPr lang="en-US" smtClean="0"/>
+              <a:t>12</a:t>
+            </a:fld>
+            <a:endParaRPr lang="en-US"/>
+          </a:p>
+        </p:txBody>
+      </p:sp>
+    </p:spTree>
+    <p:extLst>
+      <p:ext uri="{BB962C8B-B14F-4D97-AF65-F5344CB8AC3E}">
+        <p14:creationId xmlns:p14="http://schemas.microsoft.com/office/powerpoint/2010/main" val="65834447"/>
+      </p:ext>
+    </p:extLst>
+  </p:cSld>
+  <p:clrMapOvr>
+    <a:masterClrMapping/>
+  </p:clrMapOvr>
+</p:notes>
+</file>
+
+<file path=ppt/notesSlides/notesSlide13.xml><?xml version="1.0" encoding="utf-8"?>
+<p:notes xmlns:a="http://schemas.openxmlformats.org/drawingml/2006/main" xmlns:r="http://schemas.openxmlformats.org/officeDocument/2006/relationships" xmlns:p="http://schemas.openxmlformats.org/presentationml/2006/main">
+  <p:cSld>
+    <p:spTree>
+      <p:nvGrpSpPr>
+        <p:cNvPr id="1" name=""/>
+        <p:cNvGrpSpPr/>
+        <p:nvPr/>
+      </p:nvGrpSpPr>
+      <p:grpSpPr>
+        <a:xfrm>
+          <a:off x="0" y="0"/>
+          <a:ext cx="0" cy="0"/>
+          <a:chOff x="0" y="0"/>
+          <a:chExt cx="0" cy="0"/>
+        </a:xfrm>
+      </p:grpSpPr>
+      <p:sp>
+        <p:nvSpPr>
+          <p:cNvPr id="2" name="Slide Image Placeholder 1"/>
+          <p:cNvSpPr>
+            <a:spLocks noGrp="1" noRot="1" noChangeAspect="1"/>
+          </p:cNvSpPr>
+          <p:nvPr>
+            <p:ph type="sldImg"/>
+          </p:nvPr>
+        </p:nvSpPr>
+        <p:spPr/>
+      </p:sp>
+      <p:sp>
+        <p:nvSpPr>
+          <p:cNvPr id="3" name="Notes Placeholder 2"/>
+          <p:cNvSpPr>
+            <a:spLocks noGrp="1"/>
+          </p:cNvSpPr>
+          <p:nvPr>
+            <p:ph type="body" idx="1"/>
+          </p:nvPr>
+        </p:nvSpPr>
+        <p:spPr/>
+        <p:txBody>
+          <a:bodyPr/>
+          <a:lstStyle/>
+          <a:p>
+            <a:endParaRPr lang="en-US"/>
+          </a:p>
+        </p:txBody>
+      </p:sp>
+      <p:sp>
+        <p:nvSpPr>
+          <p:cNvPr id="4" name="Slide Number Placeholder 3"/>
+          <p:cNvSpPr>
+            <a:spLocks noGrp="1"/>
+          </p:cNvSpPr>
+          <p:nvPr>
+            <p:ph type="sldNum" sz="quarter" idx="10"/>
+          </p:nvPr>
+        </p:nvSpPr>
+        <p:spPr/>
+        <p:txBody>
+          <a:bodyPr/>
+          <a:lstStyle/>
+          <a:p>
+            <a:fld id="{FB37B091-7683-437D-AE5F-4E47E2ADEDA2}" type="slidenum">
+              <a:rPr lang="en-US" smtClean="0"/>
+              <a:t>13</a:t>
+            </a:fld>
+            <a:endParaRPr lang="en-US"/>
+          </a:p>
+        </p:txBody>
+      </p:sp>
+    </p:spTree>
+    <p:extLst>
+      <p:ext uri="{BB962C8B-B14F-4D97-AF65-F5344CB8AC3E}">
+        <p14:creationId xmlns:p14="http://schemas.microsoft.com/office/powerpoint/2010/main" val="1289685396"/>
+      </p:ext>
+    </p:extLst>
+  </p:cSld>
+  <p:clrMapOvr>
+    <a:masterClrMapping/>
+  </p:clrMapOvr>
+</p:notes>
+</file>
+
+<file path=ppt/notesSlides/notesSlide14.xml><?xml version="1.0" encoding="utf-8"?>
+<p:notes xmlns:a="http://schemas.openxmlformats.org/drawingml/2006/main" xmlns:r="http://schemas.openxmlformats.org/officeDocument/2006/relationships" xmlns:p="http://schemas.openxmlformats.org/presentationml/2006/main">
+  <p:cSld>
+    <p:spTree>
+      <p:nvGrpSpPr>
+        <p:cNvPr id="1" name=""/>
+        <p:cNvGrpSpPr/>
+        <p:nvPr/>
+      </p:nvGrpSpPr>
+      <p:grpSpPr>
+        <a:xfrm>
+          <a:off x="0" y="0"/>
+          <a:ext cx="0" cy="0"/>
+          <a:chOff x="0" y="0"/>
+          <a:chExt cx="0" cy="0"/>
+        </a:xfrm>
+      </p:grpSpPr>
+      <p:sp>
+        <p:nvSpPr>
+          <p:cNvPr id="2" name="Slide Image Placeholder 1"/>
+          <p:cNvSpPr>
+            <a:spLocks noGrp="1" noRot="1" noChangeAspect="1"/>
+          </p:cNvSpPr>
+          <p:nvPr>
+            <p:ph type="sldImg"/>
+          </p:nvPr>
+        </p:nvSpPr>
+        <p:spPr/>
+      </p:sp>
+      <p:sp>
+        <p:nvSpPr>
+          <p:cNvPr id="3" name="Notes Placeholder 2"/>
+          <p:cNvSpPr>
+            <a:spLocks noGrp="1"/>
+          </p:cNvSpPr>
+          <p:nvPr>
+            <p:ph type="body" idx="1"/>
+          </p:nvPr>
+        </p:nvSpPr>
+        <p:spPr/>
+        <p:txBody>
+          <a:bodyPr/>
+          <a:lstStyle/>
+          <a:p>
+            <a:endParaRPr lang="en-US"/>
+          </a:p>
+        </p:txBody>
+      </p:sp>
+      <p:sp>
+        <p:nvSpPr>
+          <p:cNvPr id="4" name="Slide Number Placeholder 3"/>
+          <p:cNvSpPr>
+            <a:spLocks noGrp="1"/>
+          </p:cNvSpPr>
+          <p:nvPr>
+            <p:ph type="sldNum" sz="quarter" idx="10"/>
+          </p:nvPr>
+        </p:nvSpPr>
+        <p:spPr/>
+        <p:txBody>
+          <a:bodyPr/>
+          <a:lstStyle/>
+          <a:p>
+            <a:fld id="{FB37B091-7683-437D-AE5F-4E47E2ADEDA2}" type="slidenum">
+              <a:rPr lang="en-US" smtClean="0"/>
+              <a:t>14</a:t>
+            </a:fld>
+            <a:endParaRPr lang="en-US"/>
+          </a:p>
+        </p:txBody>
+      </p:sp>
+    </p:spTree>
+    <p:extLst>
+      <p:ext uri="{BB962C8B-B14F-4D97-AF65-F5344CB8AC3E}">
+        <p14:creationId xmlns:p14="http://schemas.microsoft.com/office/powerpoint/2010/main" val="3211645038"/>
+      </p:ext>
+    </p:extLst>
+  </p:cSld>
+  <p:clrMapOvr>
+    <a:masterClrMapping/>
+  </p:clrMapOvr>
+</p:notes>
+</file>
+
+<file path=ppt/notesSlides/notesSlide15.xml><?xml version="1.0" encoding="utf-8"?>
+<p:notes xmlns:a="http://schemas.openxmlformats.org/drawingml/2006/main" xmlns:r="http://schemas.openxmlformats.org/officeDocument/2006/relationships" xmlns:p="http://schemas.openxmlformats.org/presentationml/2006/main">
+  <p:cSld>
+    <p:spTree>
+      <p:nvGrpSpPr>
+        <p:cNvPr id="1" name=""/>
+        <p:cNvGrpSpPr/>
+        <p:nvPr/>
+      </p:nvGrpSpPr>
+      <p:grpSpPr>
+        <a:xfrm>
+          <a:off x="0" y="0"/>
+          <a:ext cx="0" cy="0"/>
+          <a:chOff x="0" y="0"/>
+          <a:chExt cx="0" cy="0"/>
+        </a:xfrm>
+      </p:grpSpPr>
+      <p:sp>
+        <p:nvSpPr>
+          <p:cNvPr id="2" name="Slide Image Placeholder 1"/>
+          <p:cNvSpPr>
+            <a:spLocks noGrp="1" noRot="1" noChangeAspect="1"/>
+          </p:cNvSpPr>
+          <p:nvPr>
+            <p:ph type="sldImg"/>
+          </p:nvPr>
+        </p:nvSpPr>
+        <p:spPr/>
+      </p:sp>
+      <p:sp>
+        <p:nvSpPr>
+          <p:cNvPr id="3" name="Notes Placeholder 2"/>
+          <p:cNvSpPr>
+            <a:spLocks noGrp="1"/>
+          </p:cNvSpPr>
+          <p:nvPr>
+            <p:ph type="body" idx="1"/>
+          </p:nvPr>
+        </p:nvSpPr>
+        <p:spPr/>
+        <p:txBody>
+          <a:bodyPr/>
+          <a:lstStyle/>
+          <a:p>
+            <a:endParaRPr lang="en-US"/>
+          </a:p>
+        </p:txBody>
+      </p:sp>
+      <p:sp>
+        <p:nvSpPr>
+          <p:cNvPr id="4" name="Slide Number Placeholder 3"/>
+          <p:cNvSpPr>
+            <a:spLocks noGrp="1"/>
+          </p:cNvSpPr>
+          <p:nvPr>
+            <p:ph type="sldNum" sz="quarter" idx="10"/>
+          </p:nvPr>
+        </p:nvSpPr>
+        <p:spPr/>
+        <p:txBody>
+          <a:bodyPr/>
+          <a:lstStyle/>
+          <a:p>
+            <a:fld id="{FB37B091-7683-437D-AE5F-4E47E2ADEDA2}" type="slidenum">
+              <a:rPr lang="en-US" smtClean="0"/>
+              <a:t>15</a:t>
+            </a:fld>
+            <a:endParaRPr lang="en-US"/>
+          </a:p>
+        </p:txBody>
+      </p:sp>
+    </p:spTree>
+    <p:extLst>
+      <p:ext uri="{BB962C8B-B14F-4D97-AF65-F5344CB8AC3E}">
+        <p14:creationId xmlns:p14="http://schemas.microsoft.com/office/powerpoint/2010/main" val="4195420160"/>
+      </p:ext>
+    </p:extLst>
+  </p:cSld>
+  <p:clrMapOvr>
+    <a:masterClrMapping/>
+  </p:clrMapOvr>
+</p:notes>
+</file>
+
+<file path=ppt/notesSlides/notesSlide16.xml><?xml version="1.0" encoding="utf-8"?>
+<p:notes xmlns:a="http://schemas.openxmlformats.org/drawingml/2006/main" xmlns:r="http://schemas.openxmlformats.org/officeDocument/2006/relationships" xmlns:p="http://schemas.openxmlformats.org/presentationml/2006/main">
+  <p:cSld>
+    <p:spTree>
+      <p:nvGrpSpPr>
+        <p:cNvPr id="1" name=""/>
+        <p:cNvGrpSpPr/>
+        <p:nvPr/>
+      </p:nvGrpSpPr>
+      <p:grpSpPr>
+        <a:xfrm>
+          <a:off x="0" y="0"/>
+          <a:ext cx="0" cy="0"/>
+          <a:chOff x="0" y="0"/>
+          <a:chExt cx="0" cy="0"/>
+        </a:xfrm>
+      </p:grpSpPr>
+      <p:sp>
+        <p:nvSpPr>
+          <p:cNvPr id="2" name="Slide Image Placeholder 1"/>
+          <p:cNvSpPr>
+            <a:spLocks noGrp="1" noRot="1" noChangeAspect="1"/>
+          </p:cNvSpPr>
+          <p:nvPr>
+            <p:ph type="sldImg"/>
+          </p:nvPr>
+        </p:nvSpPr>
+        <p:spPr/>
+      </p:sp>
+      <p:sp>
+        <p:nvSpPr>
+          <p:cNvPr id="3" name="Notes Placeholder 2"/>
+          <p:cNvSpPr>
+            <a:spLocks noGrp="1"/>
+          </p:cNvSpPr>
+          <p:nvPr>
+            <p:ph type="body" idx="1"/>
+          </p:nvPr>
+        </p:nvSpPr>
+        <p:spPr/>
+        <p:txBody>
+          <a:bodyPr/>
+          <a:lstStyle/>
+          <a:p>
+            <a:endParaRPr lang="en-US"/>
+          </a:p>
+        </p:txBody>
+      </p:sp>
+      <p:sp>
+        <p:nvSpPr>
+          <p:cNvPr id="4" name="Slide Number Placeholder 3"/>
+          <p:cNvSpPr>
+            <a:spLocks noGrp="1"/>
+          </p:cNvSpPr>
+          <p:nvPr>
+            <p:ph type="sldNum" sz="quarter" idx="10"/>
+          </p:nvPr>
+        </p:nvSpPr>
+        <p:spPr/>
+        <p:txBody>
+          <a:bodyPr/>
+          <a:lstStyle/>
+          <a:p>
+            <a:fld id="{FB37B091-7683-437D-AE5F-4E47E2ADEDA2}" type="slidenum">
+              <a:rPr lang="en-US" smtClean="0"/>
+              <a:t>16</a:t>
+            </a:fld>
+            <a:endParaRPr lang="en-US"/>
+          </a:p>
+        </p:txBody>
+      </p:sp>
+    </p:spTree>
+    <p:extLst>
+      <p:ext uri="{BB962C8B-B14F-4D97-AF65-F5344CB8AC3E}">
+        <p14:creationId xmlns:p14="http://schemas.microsoft.com/office/powerpoint/2010/main" val="4173108033"/>
+      </p:ext>
+    </p:extLst>
+  </p:cSld>
+  <p:clrMapOvr>
+    <a:masterClrMapping/>
+  </p:clrMapOvr>
+</p:notes>
+</file>
+
+<file path=ppt/notesSlides/notesSlide17.xml><?xml version="1.0" encoding="utf-8"?>
+<p:notes xmlns:a="http://schemas.openxmlformats.org/drawingml/2006/main" xmlns:r="http://schemas.openxmlformats.org/officeDocument/2006/relationships" xmlns:p="http://schemas.openxmlformats.org/presentationml/2006/main">
+  <p:cSld>
+    <p:spTree>
+      <p:nvGrpSpPr>
+        <p:cNvPr id="1" name=""/>
+        <p:cNvGrpSpPr/>
+        <p:nvPr/>
+      </p:nvGrpSpPr>
+      <p:grpSpPr>
+        <a:xfrm>
+          <a:off x="0" y="0"/>
+          <a:ext cx="0" cy="0"/>
+          <a:chOff x="0" y="0"/>
+          <a:chExt cx="0" cy="0"/>
+        </a:xfrm>
+      </p:grpSpPr>
+      <p:sp>
+        <p:nvSpPr>
+          <p:cNvPr id="2" name="Slide Image Placeholder 1"/>
+          <p:cNvSpPr>
+            <a:spLocks noGrp="1" noRot="1" noChangeAspect="1"/>
+          </p:cNvSpPr>
+          <p:nvPr>
+            <p:ph type="sldImg"/>
+          </p:nvPr>
+        </p:nvSpPr>
+        <p:spPr/>
+      </p:sp>
+      <p:sp>
+        <p:nvSpPr>
+          <p:cNvPr id="3" name="Notes Placeholder 2"/>
+          <p:cNvSpPr>
+            <a:spLocks noGrp="1"/>
+          </p:cNvSpPr>
+          <p:nvPr>
+            <p:ph type="body" idx="1"/>
+          </p:nvPr>
+        </p:nvSpPr>
+        <p:spPr/>
+        <p:txBody>
+          <a:bodyPr/>
+          <a:lstStyle/>
+          <a:p>
+            <a:endParaRPr lang="en-US"/>
+          </a:p>
+        </p:txBody>
+      </p:sp>
+      <p:sp>
+        <p:nvSpPr>
+          <p:cNvPr id="4" name="Slide Number Placeholder 3"/>
+          <p:cNvSpPr>
+            <a:spLocks noGrp="1"/>
+          </p:cNvSpPr>
+          <p:nvPr>
+            <p:ph type="sldNum" sz="quarter" idx="10"/>
+          </p:nvPr>
+        </p:nvSpPr>
+        <p:spPr/>
+        <p:txBody>
+          <a:bodyPr/>
+          <a:lstStyle/>
+          <a:p>
+            <a:fld id="{FB37B091-7683-437D-AE5F-4E47E2ADEDA2}" type="slidenum">
+              <a:rPr lang="en-US" smtClean="0"/>
+              <a:t>17</a:t>
+            </a:fld>
+            <a:endParaRPr lang="en-US"/>
+          </a:p>
+        </p:txBody>
+      </p:sp>
+    </p:spTree>
+    <p:extLst>
+      <p:ext uri="{BB962C8B-B14F-4D97-AF65-F5344CB8AC3E}">
+        <p14:creationId xmlns:p14="http://schemas.microsoft.com/office/powerpoint/2010/main" val="3131674679"/>
+      </p:ext>
+    </p:extLst>
+  </p:cSld>
+  <p:clrMapOvr>
+    <a:masterClrMapping/>
+  </p:clrMapOvr>
+</p:notes>
+</file>
+
 <file path=ppt/notesSlides/notesSlide2.xml><?xml version="1.0" encoding="utf-8"?>
 <p:notes xmlns:a="http://schemas.openxmlformats.org/drawingml/2006/main" xmlns:r="http://schemas.openxmlformats.org/officeDocument/2006/relationships" xmlns:p="http://schemas.openxmlformats.org/presentationml/2006/main">
   <p:cSld>
@@ -1757,7 +2272,7 @@
           <a:p>
             <a:fld id="{199CB0F2-5E64-4FDC-A65B-FAD05700417F}" type="datetime1">
               <a:rPr lang="en-US" smtClean="0"/>
-              <a:t>5/4/2014</a:t>
+              <a:t>5/10/2014</a:t>
             </a:fld>
             <a:endParaRPr lang="en-US"/>
           </a:p>
@@ -2059,7 +2574,7 @@
           <a:p>
             <a:fld id="{D26A04C8-3065-4232-9225-C19A58AF24A3}" type="datetime1">
               <a:rPr lang="en-US" smtClean="0"/>
-              <a:t>5/4/2014</a:t>
+              <a:t>5/10/2014</a:t>
             </a:fld>
             <a:endParaRPr lang="en-US"/>
           </a:p>
@@ -2255,7 +2770,7 @@
           <a:p>
             <a:fld id="{8D16DDC9-0B83-481D-A43B-C0943B443FEE}" type="datetime1">
               <a:rPr lang="en-US" smtClean="0"/>
-              <a:t>5/4/2014</a:t>
+              <a:t>5/10/2014</a:t>
             </a:fld>
             <a:endParaRPr lang="en-US"/>
           </a:p>
@@ -2520,7 +3035,7 @@
           <a:p>
             <a:fld id="{43AE913E-E4C8-42E1-8C7F-E8C2002E83DE}" type="datetime1">
               <a:rPr lang="en-US" smtClean="0"/>
-              <a:t>5/4/2014</a:t>
+              <a:t>5/10/2014</a:t>
             </a:fld>
             <a:endParaRPr lang="en-US"/>
           </a:p>
@@ -2948,7 +3463,7 @@
           <a:p>
             <a:fld id="{A1146575-D207-453B-A878-FC02B69A95B6}" type="datetime1">
               <a:rPr lang="en-US" smtClean="0"/>
-              <a:t>5/4/2014</a:t>
+              <a:t>5/10/2014</a:t>
             </a:fld>
             <a:endParaRPr lang="en-US"/>
           </a:p>
@@ -3489,7 +4004,7 @@
           <a:p>
             <a:fld id="{359FFA5E-7DEB-472B-803E-3285DC7C19F2}" type="datetime1">
               <a:rPr lang="en-US" smtClean="0"/>
-              <a:t>5/4/2014</a:t>
+              <a:t>5/10/2014</a:t>
             </a:fld>
             <a:endParaRPr lang="en-US"/>
           </a:p>
@@ -4357,7 +4872,7 @@
           <a:p>
             <a:fld id="{FF13DD8E-0518-4DB1-92A7-FCFA91A95747}" type="datetime1">
               <a:rPr lang="en-US" smtClean="0"/>
-              <a:t>5/4/2014</a:t>
+              <a:t>5/10/2014</a:t>
             </a:fld>
             <a:endParaRPr lang="en-US"/>
           </a:p>
@@ -4531,7 +5046,7 @@
           <a:p>
             <a:fld id="{5E38FF20-463D-47E8-A6C6-71CF0B38508D}" type="datetime1">
               <a:rPr lang="en-US" smtClean="0"/>
-              <a:t>5/4/2014</a:t>
+              <a:t>5/10/2014</a:t>
             </a:fld>
             <a:endParaRPr lang="en-US"/>
           </a:p>
@@ -4719,7 +5234,7 @@
           <a:p>
             <a:fld id="{70E52866-9478-4DDB-9B31-38A3008CE8BA}" type="datetime1">
               <a:rPr lang="en-US" smtClean="0"/>
-              <a:t>5/4/2014</a:t>
+              <a:t>5/10/2014</a:t>
             </a:fld>
             <a:endParaRPr lang="en-US"/>
           </a:p>
@@ -4893,7 +5408,7 @@
           <a:p>
             <a:fld id="{ACE54BBB-579E-4FEE-BF59-30C440E735FC}" type="datetime1">
               <a:rPr lang="en-US" smtClean="0"/>
-              <a:t>5/4/2014</a:t>
+              <a:t>5/10/2014</a:t>
             </a:fld>
             <a:endParaRPr lang="en-US"/>
           </a:p>
@@ -5141,7 +5656,7 @@
           <a:p>
             <a:fld id="{5571496C-7BE6-4FA2-A358-9C68C54ADDAD}" type="datetime1">
               <a:rPr lang="en-US" smtClean="0"/>
-              <a:t>5/4/2014</a:t>
+              <a:t>5/10/2014</a:t>
             </a:fld>
             <a:endParaRPr lang="en-US"/>
           </a:p>
@@ -5381,7 +5896,7 @@
           <a:p>
             <a:fld id="{A5AAF6AC-A8ED-46B7-8C0D-11C07A192D32}" type="datetime1">
               <a:rPr lang="en-US" smtClean="0"/>
-              <a:t>5/4/2014</a:t>
+              <a:t>5/10/2014</a:t>
             </a:fld>
             <a:endParaRPr lang="en-US"/>
           </a:p>
@@ -5851,7 +6366,7 @@
           <a:p>
             <a:fld id="{3412E262-B175-405B-85F8-4381CFEA1F38}" type="datetime1">
               <a:rPr lang="en-US" smtClean="0"/>
-              <a:t>5/4/2014</a:t>
+              <a:t>5/10/2014</a:t>
             </a:fld>
             <a:endParaRPr lang="en-US"/>
           </a:p>
@@ -5973,7 +6488,7 @@
           <a:p>
             <a:fld id="{B45C680F-7247-42A7-A907-23BC55F9049B}" type="datetime1">
               <a:rPr lang="en-US" smtClean="0"/>
-              <a:t>5/4/2014</a:t>
+              <a:t>5/10/2014</a:t>
             </a:fld>
             <a:endParaRPr lang="en-US"/>
           </a:p>
@@ -6072,7 +6587,7 @@
           <a:p>
             <a:fld id="{719355CB-0A50-4AB2-98DF-C98136DB2D9B}" type="datetime1">
               <a:rPr lang="en-US" smtClean="0"/>
-              <a:t>5/4/2014</a:t>
+              <a:t>5/10/2014</a:t>
             </a:fld>
             <a:endParaRPr lang="en-US"/>
           </a:p>
@@ -6331,7 +6846,7 @@
           <a:p>
             <a:fld id="{D5F40FB6-380C-4907-8BA4-D56F0CA681B1}" type="datetime1">
               <a:rPr lang="en-US" smtClean="0"/>
-              <a:t>5/4/2014</a:t>
+              <a:t>5/10/2014</a:t>
             </a:fld>
             <a:endParaRPr lang="en-US"/>
           </a:p>
@@ -6635,7 +7150,7 @@
           <a:p>
             <a:fld id="{C6FCE1E9-1467-49E5-97B3-FC58BCE366F0}" type="datetime1">
               <a:rPr lang="en-US" smtClean="0"/>
-              <a:t>5/4/2014</a:t>
+              <a:t>5/10/2014</a:t>
             </a:fld>
             <a:endParaRPr lang="en-US"/>
           </a:p>
@@ -6873,7 +7388,7 @@
           <a:p>
             <a:fld id="{76F72D70-7257-4DB5-B04C-FA12CC2C6153}" type="datetime1">
               <a:rPr lang="en-US" smtClean="0"/>
-              <a:t>5/4/2014</a:t>
+              <a:t>5/10/2014</a:t>
             </a:fld>
             <a:endParaRPr lang="en-US"/>
           </a:p>
@@ -7835,7 +8350,7 @@
         <p:spPr>
           <a:xfrm>
             <a:off x="913795" y="495073"/>
-            <a:ext cx="3171568" cy="584775"/>
+            <a:ext cx="3171568" cy="369332"/>
           </a:xfrm>
           <a:prstGeom prst="rect">
             <a:avLst/>
@@ -7849,10 +8364,524 @@
           <a:lstStyle/>
           <a:p>
             <a:r>
-              <a:rPr lang="en-US" sz="3200" dirty="0" smtClean="0"/>
-              <a:t>Layout</a:t>
+              <a:rPr lang="en-US" dirty="0" smtClean="0"/>
+              <a:t>Canvas</a:t>
             </a:r>
             <a:endParaRPr lang="en-US" dirty="0"/>
+          </a:p>
+        </p:txBody>
+      </p:sp>
+      <p:sp>
+        <p:nvSpPr>
+          <p:cNvPr id="2" name="TextBox 1"/>
+          <p:cNvSpPr txBox="1"/>
+          <p:nvPr/>
+        </p:nvSpPr>
+        <p:spPr>
+          <a:xfrm>
+            <a:off x="913795" y="1238878"/>
+            <a:ext cx="9877167" cy="646331"/>
+          </a:xfrm>
+          <a:prstGeom prst="rect">
+            <a:avLst/>
+          </a:prstGeom>
+          <a:noFill/>
+        </p:spPr>
+        <p:txBody>
+          <a:bodyPr wrap="square" rtlCol="0">
+            <a:spAutoFit/>
+          </a:bodyPr>
+          <a:lstStyle/>
+          <a:p>
+            <a:r>
+              <a:rPr lang="en-US" dirty="0"/>
+              <a:t>You can position elements in a Canvas by using its attached properties: Left, Top, Right,</a:t>
+            </a:r>
+          </a:p>
+          <a:p>
+            <a:r>
+              <a:rPr lang="en-US" dirty="0"/>
+              <a:t>and Bottom.</a:t>
+            </a:r>
+            <a:endParaRPr lang="en-US" dirty="0"/>
+          </a:p>
+        </p:txBody>
+      </p:sp>
+      <p:sp>
+        <p:nvSpPr>
+          <p:cNvPr id="3" name="TextBox 2"/>
+          <p:cNvSpPr txBox="1"/>
+          <p:nvPr/>
+        </p:nvSpPr>
+        <p:spPr>
+          <a:xfrm>
+            <a:off x="889685" y="1993786"/>
+            <a:ext cx="10692714" cy="369332"/>
+          </a:xfrm>
+          <a:prstGeom prst="rect">
+            <a:avLst/>
+          </a:prstGeom>
+          <a:noFill/>
+        </p:spPr>
+        <p:txBody>
+          <a:bodyPr wrap="square" rtlCol="0">
+            <a:spAutoFit/>
+          </a:bodyPr>
+          <a:lstStyle/>
+          <a:p>
+            <a:r>
+              <a:rPr lang="en-US" dirty="0" smtClean="0"/>
+              <a:t>Usable </a:t>
+            </a:r>
+            <a:r>
+              <a:rPr lang="en-US" dirty="0"/>
+              <a:t>Inside </a:t>
+            </a:r>
+            <a:r>
+              <a:rPr lang="en-US" dirty="0" smtClean="0"/>
+              <a:t>Canvas</a:t>
+            </a:r>
+            <a:r>
+              <a:rPr lang="en-US" dirty="0"/>
+              <a:t>?</a:t>
+            </a:r>
+            <a:endParaRPr lang="en-US" dirty="0"/>
+          </a:p>
+        </p:txBody>
+      </p:sp>
+      <p:graphicFrame>
+        <p:nvGraphicFramePr>
+          <p:cNvPr id="7" name="Table 6"/>
+          <p:cNvGraphicFramePr>
+            <a:graphicFrameLocks noGrp="1"/>
+          </p:cNvGraphicFramePr>
+          <p:nvPr>
+            <p:extLst>
+              <p:ext uri="{D42A27DB-BD31-4B8C-83A1-F6EECF244321}">
+                <p14:modId xmlns:p14="http://schemas.microsoft.com/office/powerpoint/2010/main" val="646658462"/>
+              </p:ext>
+            </p:extLst>
+          </p:nvPr>
+        </p:nvGraphicFramePr>
+        <p:xfrm>
+          <a:off x="1010341" y="2599363"/>
+          <a:ext cx="10270370" cy="2225040"/>
+        </p:xfrm>
+        <a:graphic>
+          <a:graphicData uri="http://schemas.openxmlformats.org/drawingml/2006/table">
+            <a:tbl>
+              <a:tblPr firstRow="1" bandRow="1">
+                <a:tableStyleId>{5C22544A-7EE6-4342-B048-85BDC9FD1C3A}</a:tableStyleId>
+              </a:tblPr>
+              <a:tblGrid>
+                <a:gridCol w="2684582"/>
+                <a:gridCol w="7585788"/>
+              </a:tblGrid>
+              <a:tr h="656743">
+                <a:tc>
+                  <a:txBody>
+                    <a:bodyPr/>
+                    <a:lstStyle/>
+                    <a:p>
+                      <a:pPr algn="l"/>
+                      <a:r>
+                        <a:rPr lang="en-US" sz="1600" b="0" dirty="0" smtClean="0"/>
+                        <a:t>Margin </a:t>
+                      </a:r>
+                      <a:endParaRPr lang="en-US" sz="1600" b="0" dirty="0"/>
+                    </a:p>
+                  </a:txBody>
+                  <a:tcPr>
+                    <a:noFill/>
+                  </a:tcPr>
+                </a:tc>
+                <a:tc>
+                  <a:txBody>
+                    <a:bodyPr/>
+                    <a:lstStyle/>
+                    <a:p>
+                      <a:pPr marL="0" marR="0" indent="0" algn="l" defTabSz="457200" rtl="0" eaLnBrk="1" fontAlgn="auto" latinLnBrk="0" hangingPunct="1">
+                        <a:lnSpc>
+                          <a:spcPct val="100000"/>
+                        </a:lnSpc>
+                        <a:spcBef>
+                          <a:spcPts val="0"/>
+                        </a:spcBef>
+                        <a:spcAft>
+                          <a:spcPts val="0"/>
+                        </a:spcAft>
+                        <a:buClrTx/>
+                        <a:buSzTx/>
+                        <a:buFontTx/>
+                        <a:buNone/>
+                        <a:tabLst/>
+                        <a:defRPr/>
+                      </a:pPr>
+                      <a:r>
+                        <a:rPr lang="en-US" sz="1600" b="0" dirty="0" smtClean="0"/>
+                        <a:t>Partially. On the two sides used to position the element (Top and Left by default), the relevant two out of four margin values are added to the attached property values.</a:t>
+                      </a:r>
+                    </a:p>
+                    <a:p>
+                      <a:endParaRPr lang="en-US" sz="1600" b="0" dirty="0"/>
+                    </a:p>
+                  </a:txBody>
+                  <a:tcPr>
+                    <a:noFill/>
+                  </a:tcPr>
+                </a:tc>
+              </a:tr>
+              <a:tr h="462153">
+                <a:tc>
+                  <a:txBody>
+                    <a:bodyPr/>
+                    <a:lstStyle/>
+                    <a:p>
+                      <a:pPr algn="l"/>
+                      <a:r>
+                        <a:rPr lang="en-US" sz="1600" dirty="0" err="1" smtClean="0">
+                          <a:solidFill>
+                            <a:schemeClr val="tx1"/>
+                          </a:solidFill>
+                        </a:rPr>
+                        <a:t>HorizontalAlignment</a:t>
+                      </a:r>
+                      <a:r>
+                        <a:rPr lang="en-US" sz="1600" dirty="0" smtClean="0">
+                          <a:solidFill>
+                            <a:schemeClr val="tx1"/>
+                          </a:solidFill>
+                        </a:rPr>
+                        <a:t> and </a:t>
+                      </a:r>
+                    </a:p>
+                    <a:p>
+                      <a:pPr algn="l"/>
+                      <a:r>
+                        <a:rPr lang="en-US" sz="1600" dirty="0" err="1" smtClean="0">
+                          <a:solidFill>
+                            <a:schemeClr val="tx1"/>
+                          </a:solidFill>
+                        </a:rPr>
+                        <a:t>VerticalAlignment</a:t>
+                      </a:r>
+                      <a:r>
+                        <a:rPr lang="en-US" sz="1600" dirty="0" smtClean="0">
+                          <a:solidFill>
+                            <a:schemeClr val="tx1"/>
+                          </a:solidFill>
+                        </a:rPr>
+                        <a:t> </a:t>
+                      </a:r>
+                      <a:endParaRPr lang="en-US" sz="1600" dirty="0">
+                        <a:solidFill>
+                          <a:schemeClr val="tx1"/>
+                        </a:solidFill>
+                      </a:endParaRPr>
+                    </a:p>
+                  </a:txBody>
+                  <a:tcPr>
+                    <a:noFill/>
+                  </a:tcPr>
+                </a:tc>
+                <a:tc>
+                  <a:txBody>
+                    <a:bodyPr/>
+                    <a:lstStyle/>
+                    <a:p>
+                      <a:pPr marL="0" marR="0" indent="0" algn="l" defTabSz="457200" rtl="0" eaLnBrk="1" fontAlgn="auto" latinLnBrk="0" hangingPunct="1">
+                        <a:lnSpc>
+                          <a:spcPct val="100000"/>
+                        </a:lnSpc>
+                        <a:spcBef>
+                          <a:spcPts val="0"/>
+                        </a:spcBef>
+                        <a:spcAft>
+                          <a:spcPts val="0"/>
+                        </a:spcAft>
+                        <a:buClrTx/>
+                        <a:buSzTx/>
+                        <a:buFontTx/>
+                        <a:buNone/>
+                        <a:tabLst/>
+                        <a:defRPr/>
+                      </a:pPr>
+                      <a:r>
+                        <a:rPr lang="en-US" sz="1600" dirty="0" smtClean="0">
+                          <a:solidFill>
+                            <a:schemeClr val="tx1"/>
+                          </a:solidFill>
+                        </a:rPr>
+                        <a:t>No. Elements are given only the exact space they need.</a:t>
+                      </a:r>
+                    </a:p>
+                    <a:p>
+                      <a:endParaRPr lang="en-US" sz="1600" dirty="0">
+                        <a:solidFill>
+                          <a:schemeClr val="tx1"/>
+                        </a:solidFill>
+                      </a:endParaRPr>
+                    </a:p>
+                  </a:txBody>
+                  <a:tcPr>
+                    <a:noFill/>
+                  </a:tcPr>
+                </a:tc>
+              </a:tr>
+              <a:tr h="656743">
+                <a:tc>
+                  <a:txBody>
+                    <a:bodyPr/>
+                    <a:lstStyle/>
+                    <a:p>
+                      <a:pPr algn="l"/>
+                      <a:r>
+                        <a:rPr lang="en-US" sz="1600" dirty="0" err="1" smtClean="0">
+                          <a:solidFill>
+                            <a:schemeClr val="tx1"/>
+                          </a:solidFill>
+                        </a:rPr>
+                        <a:t>LayoutTransform</a:t>
+                      </a:r>
+                      <a:endParaRPr lang="en-US" sz="1600" dirty="0">
+                        <a:solidFill>
+                          <a:schemeClr val="tx1"/>
+                        </a:solidFill>
+                      </a:endParaRPr>
+                    </a:p>
+                  </a:txBody>
+                  <a:tcPr>
+                    <a:noFill/>
+                  </a:tcPr>
+                </a:tc>
+                <a:tc>
+                  <a:txBody>
+                    <a:bodyPr/>
+                    <a:lstStyle/>
+                    <a:p>
+                      <a:pPr marL="0" marR="0" indent="0" algn="l" defTabSz="457200" rtl="0" eaLnBrk="1" fontAlgn="auto" latinLnBrk="0" hangingPunct="1">
+                        <a:lnSpc>
+                          <a:spcPct val="100000"/>
+                        </a:lnSpc>
+                        <a:spcBef>
+                          <a:spcPts val="0"/>
+                        </a:spcBef>
+                        <a:spcAft>
+                          <a:spcPts val="0"/>
+                        </a:spcAft>
+                        <a:buClrTx/>
+                        <a:buSzTx/>
+                        <a:buFontTx/>
+                        <a:buNone/>
+                        <a:tabLst/>
+                        <a:defRPr/>
+                      </a:pPr>
+                      <a:r>
+                        <a:rPr lang="en-US" sz="1600" dirty="0" smtClean="0">
+                          <a:solidFill>
+                            <a:schemeClr val="tx1"/>
+                          </a:solidFill>
+                        </a:rPr>
+                        <a:t>Yes. Differs from </a:t>
+                      </a:r>
+                      <a:r>
+                        <a:rPr lang="en-US" sz="1600" dirty="0" err="1" smtClean="0">
+                          <a:solidFill>
+                            <a:schemeClr val="tx1"/>
+                          </a:solidFill>
+                        </a:rPr>
+                        <a:t>RenderTransform</a:t>
+                      </a:r>
+                      <a:r>
+                        <a:rPr lang="en-US" sz="1600" dirty="0" smtClean="0">
+                          <a:solidFill>
+                            <a:schemeClr val="tx1"/>
+                          </a:solidFill>
+                        </a:rPr>
+                        <a:t> because when </a:t>
+                      </a:r>
+                      <a:r>
+                        <a:rPr lang="en-US" sz="1600" dirty="0" err="1" smtClean="0">
+                          <a:solidFill>
+                            <a:schemeClr val="tx1"/>
+                          </a:solidFill>
+                        </a:rPr>
+                        <a:t>LayoutTransform</a:t>
+                      </a:r>
+                      <a:r>
+                        <a:rPr lang="en-US" sz="1600" dirty="0" smtClean="0">
+                          <a:solidFill>
+                            <a:schemeClr val="tx1"/>
+                          </a:solidFill>
+                        </a:rPr>
+                        <a:t> is used, elements always remain the specified distance from the selected corner of the Canvas.</a:t>
+                      </a:r>
+                    </a:p>
+                    <a:p>
+                      <a:endParaRPr lang="en-US" sz="1600" dirty="0">
+                        <a:solidFill>
+                          <a:schemeClr val="tx1"/>
+                        </a:solidFill>
+                      </a:endParaRPr>
+                    </a:p>
+                  </a:txBody>
+                  <a:tcPr>
+                    <a:noFill/>
+                  </a:tcPr>
+                </a:tc>
+              </a:tr>
+            </a:tbl>
+          </a:graphicData>
+        </a:graphic>
+      </p:graphicFrame>
+      <p:sp>
+        <p:nvSpPr>
+          <p:cNvPr id="8" name="TextBox 7"/>
+          <p:cNvSpPr txBox="1"/>
+          <p:nvPr/>
+        </p:nvSpPr>
+        <p:spPr>
+          <a:xfrm>
+            <a:off x="913795" y="5051058"/>
+            <a:ext cx="6186196" cy="923330"/>
+          </a:xfrm>
+          <a:prstGeom prst="rect">
+            <a:avLst/>
+          </a:prstGeom>
+          <a:noFill/>
+        </p:spPr>
+        <p:txBody>
+          <a:bodyPr wrap="square" rtlCol="0">
+            <a:spAutoFit/>
+          </a:bodyPr>
+          <a:lstStyle/>
+          <a:p>
+            <a:r>
+              <a:rPr lang="en-US" dirty="0" smtClean="0"/>
+              <a:t>Z-Index</a:t>
+            </a:r>
+          </a:p>
+          <a:p>
+            <a:pPr marL="285750" indent="-285750">
+              <a:buFont typeface="Arial" panose="020B0604020202020204" pitchFamily="34" charset="0"/>
+              <a:buChar char="•"/>
+            </a:pPr>
+            <a:r>
+              <a:rPr lang="en-US" b="1" dirty="0" err="1" smtClean="0"/>
+              <a:t>Canvas.ZIndex</a:t>
+            </a:r>
+            <a:r>
+              <a:rPr lang="en-US" b="1" dirty="0" smtClean="0"/>
+              <a:t>=“1”</a:t>
+            </a:r>
+            <a:endParaRPr lang="en-US" dirty="0" smtClean="0"/>
+          </a:p>
+          <a:p>
+            <a:pPr marL="285750" indent="-285750">
+              <a:buFont typeface="Arial" panose="020B0604020202020204" pitchFamily="34" charset="0"/>
+              <a:buChar char="•"/>
+            </a:pPr>
+            <a:r>
+              <a:rPr lang="en-US" dirty="0" err="1" smtClean="0"/>
+              <a:t>Panel.SetZIndex</a:t>
+            </a:r>
+            <a:r>
+              <a:rPr lang="en-US" dirty="0" smtClean="0"/>
+              <a:t>(</a:t>
+            </a:r>
+            <a:r>
+              <a:rPr lang="en-US" dirty="0" err="1" smtClean="0"/>
+              <a:t>redButton</a:t>
+            </a:r>
+            <a:r>
+              <a:rPr lang="en-US" dirty="0"/>
+              <a:t>, 0);</a:t>
+            </a:r>
+            <a:endParaRPr lang="en-US" dirty="0"/>
+          </a:p>
+        </p:txBody>
+      </p:sp>
+      <p:sp>
+        <p:nvSpPr>
+          <p:cNvPr id="9" name="TextBox 8"/>
+          <p:cNvSpPr txBox="1"/>
+          <p:nvPr/>
+        </p:nvSpPr>
+        <p:spPr>
+          <a:xfrm rot="16200000">
+            <a:off x="-1035739" y="2943715"/>
+            <a:ext cx="3204516" cy="646331"/>
+          </a:xfrm>
+          <a:prstGeom prst="rect">
+            <a:avLst/>
+          </a:prstGeom>
+          <a:noFill/>
+        </p:spPr>
+        <p:txBody>
+          <a:bodyPr wrap="square" rtlCol="0">
+            <a:spAutoFit/>
+          </a:bodyPr>
+          <a:lstStyle/>
+          <a:p>
+            <a:r>
+              <a:rPr lang="en-US" sz="3600" dirty="0" smtClean="0">
+                <a:solidFill>
+                  <a:srgbClr val="92D050"/>
+                </a:solidFill>
+              </a:rPr>
+              <a:t>{</a:t>
+            </a:r>
+            <a:r>
+              <a:rPr lang="en-US" sz="3600" dirty="0" smtClean="0"/>
+              <a:t>Live Demo</a:t>
+            </a:r>
+            <a:r>
+              <a:rPr lang="en-US" sz="3600" dirty="0" smtClean="0">
+                <a:solidFill>
+                  <a:srgbClr val="92D050"/>
+                </a:solidFill>
+              </a:rPr>
+              <a:t>}</a:t>
+            </a:r>
+            <a:endParaRPr lang="en-US" sz="3600" dirty="0">
+              <a:solidFill>
+                <a:srgbClr val="92D050"/>
+              </a:solidFill>
+            </a:endParaRPr>
+          </a:p>
+        </p:txBody>
+      </p:sp>
+      <p:sp>
+        <p:nvSpPr>
+          <p:cNvPr id="10" name="TextBox 9"/>
+          <p:cNvSpPr txBox="1"/>
+          <p:nvPr/>
+        </p:nvSpPr>
+        <p:spPr>
+          <a:xfrm>
+            <a:off x="1408754" y="815258"/>
+            <a:ext cx="6771503" cy="369332"/>
+          </a:xfrm>
+          <a:prstGeom prst="rect">
+            <a:avLst/>
+          </a:prstGeom>
+          <a:noFill/>
+        </p:spPr>
+        <p:txBody>
+          <a:bodyPr wrap="square" rtlCol="0">
+            <a:spAutoFit/>
+          </a:bodyPr>
+          <a:lstStyle/>
+          <a:p>
+            <a:r>
+              <a:rPr lang="en-US" dirty="0" smtClean="0"/>
+              <a:t>~ </a:t>
+            </a:r>
+            <a:r>
+              <a:rPr lang="en-US" dirty="0" err="1" smtClean="0"/>
+              <a:t>System.Windows.Controls</a:t>
+            </a:r>
+            <a:endParaRPr lang="en-US" dirty="0" smtClean="0"/>
           </a:p>
         </p:txBody>
       </p:sp>
@@ -7860,6 +8889,2737 @@
     <p:extLst>
       <p:ext uri="{BB962C8B-B14F-4D97-AF65-F5344CB8AC3E}">
         <p14:creationId xmlns:p14="http://schemas.microsoft.com/office/powerpoint/2010/main" val="2376149761"/>
+      </p:ext>
+    </p:extLst>
+  </p:cSld>
+  <p:clrMapOvr>
+    <a:masterClrMapping/>
+  </p:clrMapOvr>
+</p:sld>
+</file>
+
+<file path=ppt/slides/slide12.xml><?xml version="1.0" encoding="utf-8"?>
+<p:sld xmlns:a="http://schemas.openxmlformats.org/drawingml/2006/main" xmlns:r="http://schemas.openxmlformats.org/officeDocument/2006/relationships" xmlns:p="http://schemas.openxmlformats.org/presentationml/2006/main">
+  <p:cSld>
+    <p:spTree>
+      <p:nvGrpSpPr>
+        <p:cNvPr id="1" name=""/>
+        <p:cNvGrpSpPr/>
+        <p:nvPr/>
+      </p:nvGrpSpPr>
+      <p:grpSpPr>
+        <a:xfrm>
+          <a:off x="0" y="0"/>
+          <a:ext cx="0" cy="0"/>
+          <a:chOff x="0" y="0"/>
+          <a:chExt cx="0" cy="0"/>
+        </a:xfrm>
+      </p:grpSpPr>
+      <p:sp>
+        <p:nvSpPr>
+          <p:cNvPr id="4" name="Footer Placeholder 3"/>
+          <p:cNvSpPr>
+            <a:spLocks noGrp="1"/>
+          </p:cNvSpPr>
+          <p:nvPr>
+            <p:ph type="ftr" sz="quarter" idx="11"/>
+          </p:nvPr>
+        </p:nvSpPr>
+        <p:spPr>
+          <a:xfrm>
+            <a:off x="106486" y="6385783"/>
+            <a:ext cx="6672865" cy="365125"/>
+          </a:xfrm>
+        </p:spPr>
+        <p:txBody>
+          <a:bodyPr/>
+          <a:lstStyle/>
+          <a:p>
+            <a:r>
+              <a:rPr lang="fi-FI" sz="2000" dirty="0" smtClean="0"/>
+              <a:t>Tamas Santa - EPAM Systems - 2014</a:t>
+            </a:r>
+            <a:endParaRPr lang="en-US" sz="2000" dirty="0"/>
+          </a:p>
+        </p:txBody>
+      </p:sp>
+      <p:sp>
+        <p:nvSpPr>
+          <p:cNvPr id="5" name="TextBox 4"/>
+          <p:cNvSpPr txBox="1"/>
+          <p:nvPr/>
+        </p:nvSpPr>
+        <p:spPr>
+          <a:xfrm>
+            <a:off x="9020432" y="156519"/>
+            <a:ext cx="3072714" cy="338554"/>
+          </a:xfrm>
+          <a:prstGeom prst="rect">
+            <a:avLst/>
+          </a:prstGeom>
+          <a:noFill/>
+        </p:spPr>
+        <p:txBody>
+          <a:bodyPr wrap="square" rtlCol="0">
+            <a:spAutoFit/>
+          </a:bodyPr>
+          <a:lstStyle/>
+          <a:p>
+            <a:r>
+              <a:rPr lang="en-US" sz="1600" dirty="0" smtClean="0"/>
+              <a:t>Chapter 5 – Layout with Panels</a:t>
+            </a:r>
+            <a:endParaRPr lang="en-US" sz="1600" dirty="0"/>
+          </a:p>
+        </p:txBody>
+      </p:sp>
+      <p:sp>
+        <p:nvSpPr>
+          <p:cNvPr id="6" name="TextBox 5"/>
+          <p:cNvSpPr txBox="1"/>
+          <p:nvPr/>
+        </p:nvSpPr>
+        <p:spPr>
+          <a:xfrm>
+            <a:off x="913795" y="495073"/>
+            <a:ext cx="3171568" cy="369332"/>
+          </a:xfrm>
+          <a:prstGeom prst="rect">
+            <a:avLst/>
+          </a:prstGeom>
+          <a:noFill/>
+        </p:spPr>
+        <p:txBody>
+          <a:bodyPr wrap="square" rtlCol="0">
+            <a:spAutoFit/>
+          </a:bodyPr>
+          <a:lstStyle/>
+          <a:p>
+            <a:r>
+              <a:rPr lang="en-US" dirty="0" err="1" smtClean="0"/>
+              <a:t>StackPanel</a:t>
+            </a:r>
+            <a:endParaRPr lang="en-US" dirty="0"/>
+          </a:p>
+        </p:txBody>
+      </p:sp>
+      <p:sp>
+        <p:nvSpPr>
+          <p:cNvPr id="9" name="TextBox 8"/>
+          <p:cNvSpPr txBox="1"/>
+          <p:nvPr/>
+        </p:nvSpPr>
+        <p:spPr>
+          <a:xfrm rot="16200000">
+            <a:off x="-1035739" y="2943715"/>
+            <a:ext cx="3204516" cy="646331"/>
+          </a:xfrm>
+          <a:prstGeom prst="rect">
+            <a:avLst/>
+          </a:prstGeom>
+          <a:noFill/>
+        </p:spPr>
+        <p:txBody>
+          <a:bodyPr wrap="square" rtlCol="0">
+            <a:spAutoFit/>
+          </a:bodyPr>
+          <a:lstStyle/>
+          <a:p>
+            <a:r>
+              <a:rPr lang="en-US" sz="3600" dirty="0" smtClean="0">
+                <a:solidFill>
+                  <a:srgbClr val="92D050"/>
+                </a:solidFill>
+              </a:rPr>
+              <a:t>{</a:t>
+            </a:r>
+            <a:r>
+              <a:rPr lang="en-US" sz="3600" dirty="0" smtClean="0"/>
+              <a:t>Live Demo</a:t>
+            </a:r>
+            <a:r>
+              <a:rPr lang="en-US" sz="3600" dirty="0" smtClean="0">
+                <a:solidFill>
+                  <a:srgbClr val="92D050"/>
+                </a:solidFill>
+              </a:rPr>
+              <a:t>}</a:t>
+            </a:r>
+            <a:endParaRPr lang="en-US" sz="3600" dirty="0">
+              <a:solidFill>
+                <a:srgbClr val="92D050"/>
+              </a:solidFill>
+            </a:endParaRPr>
+          </a:p>
+        </p:txBody>
+      </p:sp>
+      <p:sp>
+        <p:nvSpPr>
+          <p:cNvPr id="10" name="TextBox 9"/>
+          <p:cNvSpPr txBox="1"/>
+          <p:nvPr/>
+        </p:nvSpPr>
+        <p:spPr>
+          <a:xfrm>
+            <a:off x="1408754" y="815258"/>
+            <a:ext cx="6771503" cy="369332"/>
+          </a:xfrm>
+          <a:prstGeom prst="rect">
+            <a:avLst/>
+          </a:prstGeom>
+          <a:noFill/>
+        </p:spPr>
+        <p:txBody>
+          <a:bodyPr wrap="square" rtlCol="0">
+            <a:spAutoFit/>
+          </a:bodyPr>
+          <a:lstStyle/>
+          <a:p>
+            <a:r>
+              <a:rPr lang="en-US" dirty="0" smtClean="0"/>
+              <a:t>~ </a:t>
+            </a:r>
+            <a:r>
+              <a:rPr lang="en-US" dirty="0" err="1" smtClean="0"/>
+              <a:t>System.Windows.Controls</a:t>
+            </a:r>
+            <a:endParaRPr lang="en-US" dirty="0" smtClean="0"/>
+          </a:p>
+        </p:txBody>
+      </p:sp>
+      <p:sp>
+        <p:nvSpPr>
+          <p:cNvPr id="11" name="TextBox 10"/>
+          <p:cNvSpPr txBox="1"/>
+          <p:nvPr/>
+        </p:nvSpPr>
+        <p:spPr>
+          <a:xfrm>
+            <a:off x="913795" y="1320109"/>
+            <a:ext cx="6755363" cy="369332"/>
+          </a:xfrm>
+          <a:prstGeom prst="rect">
+            <a:avLst/>
+          </a:prstGeom>
+          <a:noFill/>
+        </p:spPr>
+        <p:txBody>
+          <a:bodyPr wrap="square" rtlCol="0">
+            <a:spAutoFit/>
+          </a:bodyPr>
+          <a:lstStyle/>
+          <a:p>
+            <a:r>
+              <a:rPr lang="en-US" dirty="0"/>
+              <a:t>As its </a:t>
+            </a:r>
+            <a:r>
+              <a:rPr lang="en-US" dirty="0" smtClean="0"/>
+              <a:t>name suggests</a:t>
+            </a:r>
+            <a:r>
+              <a:rPr lang="en-US" dirty="0"/>
+              <a:t>, it simply stacks its children sequentially.</a:t>
+            </a:r>
+            <a:endParaRPr lang="en-US" dirty="0"/>
+          </a:p>
+        </p:txBody>
+      </p:sp>
+      <p:sp>
+        <p:nvSpPr>
+          <p:cNvPr id="12" name="TextBox 11"/>
+          <p:cNvSpPr txBox="1"/>
+          <p:nvPr/>
+        </p:nvSpPr>
+        <p:spPr>
+          <a:xfrm>
+            <a:off x="913795" y="1775813"/>
+            <a:ext cx="5551714" cy="369332"/>
+          </a:xfrm>
+          <a:prstGeom prst="rect">
+            <a:avLst/>
+          </a:prstGeom>
+          <a:noFill/>
+        </p:spPr>
+        <p:txBody>
+          <a:bodyPr wrap="square" rtlCol="0">
+            <a:spAutoFit/>
+          </a:bodyPr>
+          <a:lstStyle/>
+          <a:p>
+            <a:r>
+              <a:rPr lang="en-US" dirty="0" smtClean="0"/>
+              <a:t>Orientation</a:t>
+            </a:r>
+            <a:endParaRPr lang="en-US" dirty="0"/>
+          </a:p>
+        </p:txBody>
+      </p:sp>
+      <p:sp>
+        <p:nvSpPr>
+          <p:cNvPr id="13" name="TextBox 12"/>
+          <p:cNvSpPr txBox="1"/>
+          <p:nvPr/>
+        </p:nvSpPr>
+        <p:spPr>
+          <a:xfrm>
+            <a:off x="1138335" y="2145145"/>
+            <a:ext cx="4310742" cy="646331"/>
+          </a:xfrm>
+          <a:prstGeom prst="rect">
+            <a:avLst/>
+          </a:prstGeom>
+          <a:noFill/>
+        </p:spPr>
+        <p:txBody>
+          <a:bodyPr wrap="square" rtlCol="0">
+            <a:spAutoFit/>
+          </a:bodyPr>
+          <a:lstStyle/>
+          <a:p>
+            <a:pPr marL="285750" indent="-285750">
+              <a:buFont typeface="Arial" panose="020B0604020202020204" pitchFamily="34" charset="0"/>
+              <a:buChar char="•"/>
+            </a:pPr>
+            <a:r>
+              <a:rPr lang="en-US" dirty="0" smtClean="0"/>
+              <a:t>Horizontal</a:t>
+            </a:r>
+          </a:p>
+          <a:p>
+            <a:pPr marL="285750" indent="-285750">
+              <a:buFont typeface="Arial" panose="020B0604020202020204" pitchFamily="34" charset="0"/>
+              <a:buChar char="•"/>
+            </a:pPr>
+            <a:r>
+              <a:rPr lang="en-US" dirty="0" smtClean="0"/>
+              <a:t>Vertical</a:t>
+            </a:r>
+            <a:endParaRPr lang="en-US" dirty="0"/>
+          </a:p>
+        </p:txBody>
+      </p:sp>
+      <p:sp>
+        <p:nvSpPr>
+          <p:cNvPr id="17" name="TextBox 16"/>
+          <p:cNvSpPr txBox="1"/>
+          <p:nvPr/>
+        </p:nvSpPr>
+        <p:spPr>
+          <a:xfrm>
+            <a:off x="885803" y="2839904"/>
+            <a:ext cx="7371184" cy="369332"/>
+          </a:xfrm>
+          <a:prstGeom prst="rect">
+            <a:avLst/>
+          </a:prstGeom>
+          <a:noFill/>
+        </p:spPr>
+        <p:txBody>
+          <a:bodyPr wrap="square" rtlCol="0">
+            <a:spAutoFit/>
+          </a:bodyPr>
+          <a:lstStyle/>
+          <a:p>
+            <a:r>
+              <a:rPr lang="en-US" dirty="0" err="1" smtClean="0"/>
+              <a:t>FlowDirection</a:t>
+            </a:r>
+            <a:r>
+              <a:rPr lang="en-US" dirty="0" smtClean="0"/>
+              <a:t> affects stacking order!</a:t>
+            </a:r>
+            <a:endParaRPr lang="en-US" dirty="0"/>
+          </a:p>
+        </p:txBody>
+      </p:sp>
+      <p:sp>
+        <p:nvSpPr>
+          <p:cNvPr id="18" name="TextBox 17"/>
+          <p:cNvSpPr txBox="1"/>
+          <p:nvPr/>
+        </p:nvSpPr>
+        <p:spPr>
+          <a:xfrm>
+            <a:off x="899798" y="3319025"/>
+            <a:ext cx="6783355" cy="369332"/>
+          </a:xfrm>
+          <a:prstGeom prst="rect">
+            <a:avLst/>
+          </a:prstGeom>
+          <a:noFill/>
+        </p:spPr>
+        <p:txBody>
+          <a:bodyPr wrap="square" rtlCol="0">
+            <a:spAutoFit/>
+          </a:bodyPr>
+          <a:lstStyle/>
+          <a:p>
+            <a:r>
+              <a:rPr lang="en-US" dirty="0" err="1" smtClean="0"/>
+              <a:t>VirtualizingStackPanel</a:t>
+            </a:r>
+            <a:endParaRPr lang="en-US" dirty="0" smtClean="0"/>
+          </a:p>
+        </p:txBody>
+      </p:sp>
+      <p:sp>
+        <p:nvSpPr>
+          <p:cNvPr id="19" name="TextBox 18"/>
+          <p:cNvSpPr txBox="1"/>
+          <p:nvPr/>
+        </p:nvSpPr>
+        <p:spPr>
+          <a:xfrm>
+            <a:off x="1155971" y="3798147"/>
+            <a:ext cx="10095722" cy="923330"/>
+          </a:xfrm>
+          <a:prstGeom prst="rect">
+            <a:avLst/>
+          </a:prstGeom>
+          <a:noFill/>
+        </p:spPr>
+        <p:txBody>
+          <a:bodyPr wrap="square" rtlCol="0">
+            <a:spAutoFit/>
+          </a:bodyPr>
+          <a:lstStyle/>
+          <a:p>
+            <a:pPr marL="285750" indent="-285750">
+              <a:buFont typeface="Arial" panose="020B0604020202020204" pitchFamily="34" charset="0"/>
+              <a:buChar char="•"/>
+            </a:pPr>
+            <a:r>
+              <a:rPr lang="en-US" dirty="0"/>
+              <a:t>derive from the </a:t>
+            </a:r>
+            <a:r>
+              <a:rPr lang="en-US" dirty="0" smtClean="0"/>
+              <a:t>abstract </a:t>
+            </a:r>
+            <a:r>
+              <a:rPr lang="en-US" dirty="0" err="1" smtClean="0"/>
+              <a:t>System.Windows.Controls.VirtualizingPanel</a:t>
+            </a:r>
+            <a:r>
+              <a:rPr lang="en-US" dirty="0" smtClean="0"/>
+              <a:t> class</a:t>
+            </a:r>
+          </a:p>
+          <a:p>
+            <a:pPr marL="285750" indent="-285750">
+              <a:buFont typeface="Arial" panose="020B0604020202020204" pitchFamily="34" charset="0"/>
+              <a:buChar char="•"/>
+            </a:pPr>
+            <a:r>
+              <a:rPr lang="en-US" dirty="0"/>
+              <a:t>temporarily discards </a:t>
+            </a:r>
+            <a:r>
+              <a:rPr lang="en-US" dirty="0" smtClean="0"/>
+              <a:t>any items </a:t>
+            </a:r>
+            <a:r>
+              <a:rPr lang="en-US" dirty="0" err="1"/>
+              <a:t>offscreen</a:t>
+            </a:r>
+            <a:r>
+              <a:rPr lang="en-US" dirty="0"/>
+              <a:t> to optimize performance (only when data binding).</a:t>
+            </a:r>
+            <a:endParaRPr lang="en-US" dirty="0"/>
+          </a:p>
+          <a:p>
+            <a:endParaRPr lang="en-US" dirty="0"/>
+          </a:p>
+        </p:txBody>
+      </p:sp>
+    </p:spTree>
+    <p:extLst>
+      <p:ext uri="{BB962C8B-B14F-4D97-AF65-F5344CB8AC3E}">
+        <p14:creationId xmlns:p14="http://schemas.microsoft.com/office/powerpoint/2010/main" val="1492653142"/>
+      </p:ext>
+    </p:extLst>
+  </p:cSld>
+  <p:clrMapOvr>
+    <a:masterClrMapping/>
+  </p:clrMapOvr>
+</p:sld>
+</file>
+
+<file path=ppt/slides/slide13.xml><?xml version="1.0" encoding="utf-8"?>
+<p:sld xmlns:a="http://schemas.openxmlformats.org/drawingml/2006/main" xmlns:r="http://schemas.openxmlformats.org/officeDocument/2006/relationships" xmlns:p="http://schemas.openxmlformats.org/presentationml/2006/main">
+  <p:cSld>
+    <p:spTree>
+      <p:nvGrpSpPr>
+        <p:cNvPr id="1" name=""/>
+        <p:cNvGrpSpPr/>
+        <p:nvPr/>
+      </p:nvGrpSpPr>
+      <p:grpSpPr>
+        <a:xfrm>
+          <a:off x="0" y="0"/>
+          <a:ext cx="0" cy="0"/>
+          <a:chOff x="0" y="0"/>
+          <a:chExt cx="0" cy="0"/>
+        </a:xfrm>
+      </p:grpSpPr>
+      <p:sp>
+        <p:nvSpPr>
+          <p:cNvPr id="4" name="Footer Placeholder 3"/>
+          <p:cNvSpPr>
+            <a:spLocks noGrp="1"/>
+          </p:cNvSpPr>
+          <p:nvPr>
+            <p:ph type="ftr" sz="quarter" idx="11"/>
+          </p:nvPr>
+        </p:nvSpPr>
+        <p:spPr>
+          <a:xfrm>
+            <a:off x="106486" y="6385783"/>
+            <a:ext cx="6672865" cy="365125"/>
+          </a:xfrm>
+        </p:spPr>
+        <p:txBody>
+          <a:bodyPr/>
+          <a:lstStyle/>
+          <a:p>
+            <a:r>
+              <a:rPr lang="fi-FI" sz="2000" dirty="0" smtClean="0"/>
+              <a:t>Tamas Santa - EPAM Systems - 2014</a:t>
+            </a:r>
+            <a:endParaRPr lang="en-US" sz="2000" dirty="0"/>
+          </a:p>
+        </p:txBody>
+      </p:sp>
+      <p:sp>
+        <p:nvSpPr>
+          <p:cNvPr id="5" name="TextBox 4"/>
+          <p:cNvSpPr txBox="1"/>
+          <p:nvPr/>
+        </p:nvSpPr>
+        <p:spPr>
+          <a:xfrm>
+            <a:off x="9020432" y="156519"/>
+            <a:ext cx="3072714" cy="338554"/>
+          </a:xfrm>
+          <a:prstGeom prst="rect">
+            <a:avLst/>
+          </a:prstGeom>
+          <a:noFill/>
+        </p:spPr>
+        <p:txBody>
+          <a:bodyPr wrap="square" rtlCol="0">
+            <a:spAutoFit/>
+          </a:bodyPr>
+          <a:lstStyle/>
+          <a:p>
+            <a:r>
+              <a:rPr lang="en-US" sz="1600" dirty="0" smtClean="0"/>
+              <a:t>Chapter 5 – Layout with Panels</a:t>
+            </a:r>
+            <a:endParaRPr lang="en-US" sz="1600" dirty="0"/>
+          </a:p>
+        </p:txBody>
+      </p:sp>
+      <p:sp>
+        <p:nvSpPr>
+          <p:cNvPr id="6" name="TextBox 5"/>
+          <p:cNvSpPr txBox="1"/>
+          <p:nvPr/>
+        </p:nvSpPr>
+        <p:spPr>
+          <a:xfrm>
+            <a:off x="913795" y="495073"/>
+            <a:ext cx="3171568" cy="369332"/>
+          </a:xfrm>
+          <a:prstGeom prst="rect">
+            <a:avLst/>
+          </a:prstGeom>
+          <a:noFill/>
+        </p:spPr>
+        <p:txBody>
+          <a:bodyPr wrap="square" rtlCol="0">
+            <a:spAutoFit/>
+          </a:bodyPr>
+          <a:lstStyle/>
+          <a:p>
+            <a:r>
+              <a:rPr lang="en-US" dirty="0" err="1" smtClean="0"/>
+              <a:t>Wrap</a:t>
+            </a:r>
+            <a:r>
+              <a:rPr lang="en-US" dirty="0" err="1" smtClean="0"/>
+              <a:t>Panel</a:t>
+            </a:r>
+            <a:endParaRPr lang="en-US" dirty="0"/>
+          </a:p>
+        </p:txBody>
+      </p:sp>
+      <p:sp>
+        <p:nvSpPr>
+          <p:cNvPr id="9" name="TextBox 8"/>
+          <p:cNvSpPr txBox="1"/>
+          <p:nvPr/>
+        </p:nvSpPr>
+        <p:spPr>
+          <a:xfrm rot="16200000">
+            <a:off x="-1035739" y="2943715"/>
+            <a:ext cx="3204516" cy="646331"/>
+          </a:xfrm>
+          <a:prstGeom prst="rect">
+            <a:avLst/>
+          </a:prstGeom>
+          <a:noFill/>
+        </p:spPr>
+        <p:txBody>
+          <a:bodyPr wrap="square" rtlCol="0">
+            <a:spAutoFit/>
+          </a:bodyPr>
+          <a:lstStyle/>
+          <a:p>
+            <a:r>
+              <a:rPr lang="en-US" sz="3600" dirty="0" smtClean="0">
+                <a:solidFill>
+                  <a:srgbClr val="92D050"/>
+                </a:solidFill>
+              </a:rPr>
+              <a:t>{</a:t>
+            </a:r>
+            <a:r>
+              <a:rPr lang="en-US" sz="3600" dirty="0" smtClean="0"/>
+              <a:t>Live Demo</a:t>
+            </a:r>
+            <a:r>
+              <a:rPr lang="en-US" sz="3600" dirty="0" smtClean="0">
+                <a:solidFill>
+                  <a:srgbClr val="92D050"/>
+                </a:solidFill>
+              </a:rPr>
+              <a:t>}</a:t>
+            </a:r>
+            <a:endParaRPr lang="en-US" sz="3600" dirty="0">
+              <a:solidFill>
+                <a:srgbClr val="92D050"/>
+              </a:solidFill>
+            </a:endParaRPr>
+          </a:p>
+        </p:txBody>
+      </p:sp>
+      <p:sp>
+        <p:nvSpPr>
+          <p:cNvPr id="10" name="TextBox 9"/>
+          <p:cNvSpPr txBox="1"/>
+          <p:nvPr/>
+        </p:nvSpPr>
+        <p:spPr>
+          <a:xfrm>
+            <a:off x="1408754" y="815258"/>
+            <a:ext cx="6771503" cy="369332"/>
+          </a:xfrm>
+          <a:prstGeom prst="rect">
+            <a:avLst/>
+          </a:prstGeom>
+          <a:noFill/>
+        </p:spPr>
+        <p:txBody>
+          <a:bodyPr wrap="square" rtlCol="0">
+            <a:spAutoFit/>
+          </a:bodyPr>
+          <a:lstStyle/>
+          <a:p>
+            <a:r>
+              <a:rPr lang="en-US" dirty="0" smtClean="0"/>
+              <a:t>~ </a:t>
+            </a:r>
+            <a:r>
+              <a:rPr lang="en-US" dirty="0" err="1" smtClean="0"/>
+              <a:t>System.Windows.Controls</a:t>
+            </a:r>
+            <a:endParaRPr lang="en-US" dirty="0" smtClean="0"/>
+          </a:p>
+        </p:txBody>
+      </p:sp>
+      <p:sp>
+        <p:nvSpPr>
+          <p:cNvPr id="11" name="TextBox 10"/>
+          <p:cNvSpPr txBox="1"/>
+          <p:nvPr/>
+        </p:nvSpPr>
+        <p:spPr>
+          <a:xfrm>
+            <a:off x="913795" y="1320109"/>
+            <a:ext cx="10337898" cy="646331"/>
+          </a:xfrm>
+          <a:prstGeom prst="rect">
+            <a:avLst/>
+          </a:prstGeom>
+          <a:noFill/>
+        </p:spPr>
+        <p:txBody>
+          <a:bodyPr wrap="square" rtlCol="0">
+            <a:spAutoFit/>
+          </a:bodyPr>
+          <a:lstStyle/>
+          <a:p>
+            <a:r>
+              <a:rPr lang="en-US" dirty="0"/>
+              <a:t>I</a:t>
+            </a:r>
+            <a:r>
+              <a:rPr lang="en-US" dirty="0" smtClean="0"/>
+              <a:t>n </a:t>
+            </a:r>
+            <a:r>
+              <a:rPr lang="en-US" dirty="0"/>
+              <a:t>addition to stacking its child elements, it </a:t>
+            </a:r>
+            <a:r>
+              <a:rPr lang="en-US" dirty="0" smtClean="0"/>
+              <a:t>wraps them </a:t>
+            </a:r>
+            <a:r>
+              <a:rPr lang="en-US" dirty="0"/>
+              <a:t>to additional rows or columns when there’s not enough space for a single stack</a:t>
+            </a:r>
+            <a:endParaRPr lang="en-US" dirty="0"/>
+          </a:p>
+        </p:txBody>
+      </p:sp>
+      <p:sp>
+        <p:nvSpPr>
+          <p:cNvPr id="3" name="TextBox 2"/>
+          <p:cNvSpPr txBox="1"/>
+          <p:nvPr/>
+        </p:nvSpPr>
+        <p:spPr>
+          <a:xfrm>
+            <a:off x="1073020" y="2009626"/>
+            <a:ext cx="4180115" cy="369332"/>
+          </a:xfrm>
+          <a:prstGeom prst="rect">
+            <a:avLst/>
+          </a:prstGeom>
+          <a:noFill/>
+        </p:spPr>
+        <p:txBody>
+          <a:bodyPr wrap="square" rtlCol="0">
+            <a:spAutoFit/>
+          </a:bodyPr>
+          <a:lstStyle/>
+          <a:p>
+            <a:r>
+              <a:rPr lang="en-US" b="1"/>
+              <a:t>Orientation</a:t>
+            </a:r>
+            <a:endParaRPr lang="en-US" dirty="0"/>
+          </a:p>
+        </p:txBody>
+      </p:sp>
+      <p:sp>
+        <p:nvSpPr>
+          <p:cNvPr id="8" name="TextBox 7"/>
+          <p:cNvSpPr txBox="1"/>
+          <p:nvPr/>
+        </p:nvSpPr>
+        <p:spPr>
+          <a:xfrm>
+            <a:off x="1408754" y="2318925"/>
+            <a:ext cx="9358773" cy="369332"/>
+          </a:xfrm>
+          <a:prstGeom prst="rect">
+            <a:avLst/>
+          </a:prstGeom>
+          <a:noFill/>
+        </p:spPr>
+        <p:txBody>
+          <a:bodyPr wrap="square" rtlCol="0">
+            <a:spAutoFit/>
+          </a:bodyPr>
+          <a:lstStyle/>
+          <a:p>
+            <a:pPr marL="285750" indent="-285750">
+              <a:buFont typeface="Arial" panose="020B0604020202020204" pitchFamily="34" charset="0"/>
+              <a:buChar char="•"/>
+            </a:pPr>
+            <a:r>
+              <a:rPr lang="en-US" dirty="0" smtClean="0"/>
+              <a:t>This </a:t>
+            </a:r>
+            <a:r>
+              <a:rPr lang="en-US" dirty="0"/>
+              <a:t>is just like </a:t>
+            </a:r>
+            <a:r>
+              <a:rPr lang="en-US" dirty="0" err="1"/>
+              <a:t>StackPanel’s</a:t>
+            </a:r>
+            <a:r>
+              <a:rPr lang="en-US" dirty="0"/>
+              <a:t> property, except Horizontal is </a:t>
+            </a:r>
+            <a:r>
+              <a:rPr lang="en-US" dirty="0" smtClean="0"/>
+              <a:t>the default</a:t>
+            </a:r>
+            <a:r>
+              <a:rPr lang="en-US" dirty="0"/>
+              <a:t>.</a:t>
+            </a:r>
+          </a:p>
+        </p:txBody>
+      </p:sp>
+      <p:sp>
+        <p:nvSpPr>
+          <p:cNvPr id="14" name="TextBox 13"/>
+          <p:cNvSpPr txBox="1"/>
+          <p:nvPr/>
+        </p:nvSpPr>
+        <p:spPr>
+          <a:xfrm>
+            <a:off x="1073020" y="2701234"/>
+            <a:ext cx="1754155" cy="369332"/>
+          </a:xfrm>
+          <a:prstGeom prst="rect">
+            <a:avLst/>
+          </a:prstGeom>
+          <a:noFill/>
+        </p:spPr>
+        <p:txBody>
+          <a:bodyPr wrap="square" rtlCol="0">
+            <a:spAutoFit/>
+          </a:bodyPr>
+          <a:lstStyle/>
+          <a:p>
+            <a:r>
+              <a:rPr lang="en-US" b="1" dirty="0" err="1" smtClean="0"/>
+              <a:t>ItemHeight</a:t>
+            </a:r>
+            <a:endParaRPr lang="en-US" b="1" dirty="0"/>
+          </a:p>
+        </p:txBody>
+      </p:sp>
+      <p:sp>
+        <p:nvSpPr>
+          <p:cNvPr id="15" name="TextBox 14"/>
+          <p:cNvSpPr txBox="1"/>
+          <p:nvPr/>
+        </p:nvSpPr>
+        <p:spPr>
+          <a:xfrm>
+            <a:off x="1408754" y="3114282"/>
+            <a:ext cx="10207858" cy="646331"/>
+          </a:xfrm>
+          <a:prstGeom prst="rect">
+            <a:avLst/>
+          </a:prstGeom>
+          <a:noFill/>
+        </p:spPr>
+        <p:txBody>
+          <a:bodyPr wrap="square" rtlCol="0">
+            <a:spAutoFit/>
+          </a:bodyPr>
+          <a:lstStyle/>
+          <a:p>
+            <a:pPr marL="285750" indent="-285750">
+              <a:buFont typeface="Arial" panose="020B0604020202020204" pitchFamily="34" charset="0"/>
+              <a:buChar char="•"/>
+            </a:pPr>
+            <a:r>
+              <a:rPr lang="en-US" dirty="0" smtClean="0"/>
+              <a:t>A </a:t>
+            </a:r>
+            <a:r>
+              <a:rPr lang="en-US" dirty="0"/>
+              <a:t>uniform width for all child elements. The way each child fills </a:t>
+            </a:r>
+            <a:r>
+              <a:rPr lang="en-US" dirty="0" smtClean="0"/>
+              <a:t>that </a:t>
+            </a:r>
+            <a:r>
+              <a:rPr lang="en-US" dirty="0"/>
+              <a:t>height depends on its own </a:t>
+            </a:r>
+            <a:r>
+              <a:rPr lang="en-US" dirty="0" err="1"/>
+              <a:t>VerticalAlignment</a:t>
+            </a:r>
+            <a:r>
+              <a:rPr lang="en-US" dirty="0"/>
+              <a:t>, Height, and so forth. Any </a:t>
+            </a:r>
+            <a:r>
+              <a:rPr lang="en-US" dirty="0" smtClean="0"/>
+              <a:t>elements taller </a:t>
+            </a:r>
+            <a:r>
+              <a:rPr lang="en-US" dirty="0"/>
+              <a:t>than </a:t>
+            </a:r>
+            <a:r>
+              <a:rPr lang="en-US" dirty="0" err="1"/>
+              <a:t>ItemHeight</a:t>
+            </a:r>
+            <a:r>
+              <a:rPr lang="en-US" dirty="0"/>
+              <a:t> get clipped</a:t>
+            </a:r>
+            <a:endParaRPr lang="en-US" dirty="0"/>
+          </a:p>
+        </p:txBody>
+      </p:sp>
+      <p:sp>
+        <p:nvSpPr>
+          <p:cNvPr id="16" name="TextBox 15"/>
+          <p:cNvSpPr txBox="1"/>
+          <p:nvPr/>
+        </p:nvSpPr>
+        <p:spPr>
+          <a:xfrm>
+            <a:off x="1073020" y="3828373"/>
+            <a:ext cx="1950097" cy="369332"/>
+          </a:xfrm>
+          <a:prstGeom prst="rect">
+            <a:avLst/>
+          </a:prstGeom>
+          <a:noFill/>
+        </p:spPr>
+        <p:txBody>
+          <a:bodyPr wrap="square" rtlCol="0">
+            <a:spAutoFit/>
+          </a:bodyPr>
+          <a:lstStyle/>
+          <a:p>
+            <a:r>
+              <a:rPr lang="en-US" b="1" dirty="0" err="1" smtClean="0"/>
+              <a:t>ItemWidth</a:t>
+            </a:r>
+            <a:endParaRPr lang="en-US" b="1" dirty="0"/>
+          </a:p>
+        </p:txBody>
+      </p:sp>
+      <p:sp>
+        <p:nvSpPr>
+          <p:cNvPr id="20" name="TextBox 19"/>
+          <p:cNvSpPr txBox="1"/>
+          <p:nvPr/>
+        </p:nvSpPr>
+        <p:spPr>
+          <a:xfrm>
+            <a:off x="1379737" y="4262124"/>
+            <a:ext cx="10162467" cy="646331"/>
+          </a:xfrm>
+          <a:prstGeom prst="rect">
+            <a:avLst/>
+          </a:prstGeom>
+          <a:noFill/>
+        </p:spPr>
+        <p:txBody>
+          <a:bodyPr wrap="square" rtlCol="0">
+            <a:spAutoFit/>
+          </a:bodyPr>
+          <a:lstStyle/>
+          <a:p>
+            <a:pPr marL="285750" indent="-285750">
+              <a:buFont typeface="Arial" panose="020B0604020202020204" pitchFamily="34" charset="0"/>
+              <a:buChar char="•"/>
+            </a:pPr>
+            <a:r>
+              <a:rPr lang="en-US" dirty="0" smtClean="0"/>
+              <a:t>A </a:t>
+            </a:r>
+            <a:r>
+              <a:rPr lang="en-US" dirty="0"/>
+              <a:t>uniform width for all child elements. The way each child fills </a:t>
+            </a:r>
+            <a:r>
+              <a:rPr lang="en-US" dirty="0" smtClean="0"/>
+              <a:t>that width </a:t>
+            </a:r>
+            <a:r>
+              <a:rPr lang="en-US" dirty="0"/>
+              <a:t>depends on its own </a:t>
+            </a:r>
+            <a:r>
+              <a:rPr lang="en-US" dirty="0" err="1"/>
+              <a:t>HorizontalAlignment</a:t>
+            </a:r>
+            <a:r>
+              <a:rPr lang="en-US" dirty="0"/>
+              <a:t>, Width, and so forth. Any </a:t>
+            </a:r>
+            <a:r>
+              <a:rPr lang="en-US" dirty="0" smtClean="0"/>
+              <a:t>elements wider </a:t>
+            </a:r>
+            <a:r>
+              <a:rPr lang="en-US" dirty="0"/>
+              <a:t>than </a:t>
+            </a:r>
+            <a:r>
+              <a:rPr lang="en-US" dirty="0" err="1"/>
+              <a:t>ItemWidth</a:t>
+            </a:r>
+            <a:r>
+              <a:rPr lang="en-US" dirty="0"/>
+              <a:t> get clipped.</a:t>
+            </a:r>
+            <a:endParaRPr lang="en-US" dirty="0"/>
+          </a:p>
+        </p:txBody>
+      </p:sp>
+      <p:sp>
+        <p:nvSpPr>
+          <p:cNvPr id="21" name="TextBox 20"/>
+          <p:cNvSpPr txBox="1"/>
+          <p:nvPr/>
+        </p:nvSpPr>
+        <p:spPr>
+          <a:xfrm>
+            <a:off x="913795" y="5225300"/>
+            <a:ext cx="7371184" cy="369332"/>
+          </a:xfrm>
+          <a:prstGeom prst="rect">
+            <a:avLst/>
+          </a:prstGeom>
+          <a:noFill/>
+        </p:spPr>
+        <p:txBody>
+          <a:bodyPr wrap="square" rtlCol="0">
+            <a:spAutoFit/>
+          </a:bodyPr>
+          <a:lstStyle/>
+          <a:p>
+            <a:r>
+              <a:rPr lang="en-US" dirty="0" err="1" smtClean="0"/>
+              <a:t>FlowDirection</a:t>
+            </a:r>
+            <a:r>
+              <a:rPr lang="en-US" dirty="0" smtClean="0"/>
+              <a:t> affects stacking order!</a:t>
+            </a:r>
+            <a:endParaRPr lang="en-US" dirty="0"/>
+          </a:p>
+        </p:txBody>
+      </p:sp>
+    </p:spTree>
+    <p:extLst>
+      <p:ext uri="{BB962C8B-B14F-4D97-AF65-F5344CB8AC3E}">
+        <p14:creationId xmlns:p14="http://schemas.microsoft.com/office/powerpoint/2010/main" val="76280753"/>
+      </p:ext>
+    </p:extLst>
+  </p:cSld>
+  <p:clrMapOvr>
+    <a:masterClrMapping/>
+  </p:clrMapOvr>
+</p:sld>
+</file>
+
+<file path=ppt/slides/slide14.xml><?xml version="1.0" encoding="utf-8"?>
+<p:sld xmlns:a="http://schemas.openxmlformats.org/drawingml/2006/main" xmlns:r="http://schemas.openxmlformats.org/officeDocument/2006/relationships" xmlns:p="http://schemas.openxmlformats.org/presentationml/2006/main">
+  <p:cSld>
+    <p:spTree>
+      <p:nvGrpSpPr>
+        <p:cNvPr id="1" name=""/>
+        <p:cNvGrpSpPr/>
+        <p:nvPr/>
+      </p:nvGrpSpPr>
+      <p:grpSpPr>
+        <a:xfrm>
+          <a:off x="0" y="0"/>
+          <a:ext cx="0" cy="0"/>
+          <a:chOff x="0" y="0"/>
+          <a:chExt cx="0" cy="0"/>
+        </a:xfrm>
+      </p:grpSpPr>
+      <p:sp>
+        <p:nvSpPr>
+          <p:cNvPr id="4" name="Footer Placeholder 3"/>
+          <p:cNvSpPr>
+            <a:spLocks noGrp="1"/>
+          </p:cNvSpPr>
+          <p:nvPr>
+            <p:ph type="ftr" sz="quarter" idx="11"/>
+          </p:nvPr>
+        </p:nvSpPr>
+        <p:spPr>
+          <a:xfrm>
+            <a:off x="106486" y="6385783"/>
+            <a:ext cx="6672865" cy="365125"/>
+          </a:xfrm>
+        </p:spPr>
+        <p:txBody>
+          <a:bodyPr/>
+          <a:lstStyle/>
+          <a:p>
+            <a:r>
+              <a:rPr lang="fi-FI" sz="2000" dirty="0" smtClean="0"/>
+              <a:t>Tamas Santa - EPAM Systems - 2014</a:t>
+            </a:r>
+            <a:endParaRPr lang="en-US" sz="2000" dirty="0"/>
+          </a:p>
+        </p:txBody>
+      </p:sp>
+      <p:sp>
+        <p:nvSpPr>
+          <p:cNvPr id="5" name="TextBox 4"/>
+          <p:cNvSpPr txBox="1"/>
+          <p:nvPr/>
+        </p:nvSpPr>
+        <p:spPr>
+          <a:xfrm>
+            <a:off x="9020432" y="156519"/>
+            <a:ext cx="3072714" cy="338554"/>
+          </a:xfrm>
+          <a:prstGeom prst="rect">
+            <a:avLst/>
+          </a:prstGeom>
+          <a:noFill/>
+        </p:spPr>
+        <p:txBody>
+          <a:bodyPr wrap="square" rtlCol="0">
+            <a:spAutoFit/>
+          </a:bodyPr>
+          <a:lstStyle/>
+          <a:p>
+            <a:r>
+              <a:rPr lang="en-US" sz="1600" dirty="0" smtClean="0"/>
+              <a:t>Chapter 5 – Layout with Panels</a:t>
+            </a:r>
+            <a:endParaRPr lang="en-US" sz="1600" dirty="0"/>
+          </a:p>
+        </p:txBody>
+      </p:sp>
+      <p:sp>
+        <p:nvSpPr>
+          <p:cNvPr id="6" name="TextBox 5"/>
+          <p:cNvSpPr txBox="1"/>
+          <p:nvPr/>
+        </p:nvSpPr>
+        <p:spPr>
+          <a:xfrm>
+            <a:off x="913795" y="495073"/>
+            <a:ext cx="3171568" cy="369332"/>
+          </a:xfrm>
+          <a:prstGeom prst="rect">
+            <a:avLst/>
+          </a:prstGeom>
+          <a:noFill/>
+        </p:spPr>
+        <p:txBody>
+          <a:bodyPr wrap="square" rtlCol="0">
+            <a:spAutoFit/>
+          </a:bodyPr>
+          <a:lstStyle/>
+          <a:p>
+            <a:r>
+              <a:rPr lang="en-US" dirty="0" err="1" smtClean="0"/>
+              <a:t>DockPanel</a:t>
+            </a:r>
+            <a:endParaRPr lang="en-US" dirty="0"/>
+          </a:p>
+        </p:txBody>
+      </p:sp>
+      <p:sp>
+        <p:nvSpPr>
+          <p:cNvPr id="9" name="TextBox 8"/>
+          <p:cNvSpPr txBox="1"/>
+          <p:nvPr/>
+        </p:nvSpPr>
+        <p:spPr>
+          <a:xfrm rot="16200000">
+            <a:off x="-1035739" y="2943715"/>
+            <a:ext cx="3204516" cy="646331"/>
+          </a:xfrm>
+          <a:prstGeom prst="rect">
+            <a:avLst/>
+          </a:prstGeom>
+          <a:noFill/>
+        </p:spPr>
+        <p:txBody>
+          <a:bodyPr wrap="square" rtlCol="0">
+            <a:spAutoFit/>
+          </a:bodyPr>
+          <a:lstStyle/>
+          <a:p>
+            <a:r>
+              <a:rPr lang="en-US" sz="3600" dirty="0" smtClean="0">
+                <a:solidFill>
+                  <a:srgbClr val="92D050"/>
+                </a:solidFill>
+              </a:rPr>
+              <a:t>{</a:t>
+            </a:r>
+            <a:r>
+              <a:rPr lang="en-US" sz="3600" dirty="0" smtClean="0"/>
+              <a:t>Live Demo</a:t>
+            </a:r>
+            <a:r>
+              <a:rPr lang="en-US" sz="3600" dirty="0" smtClean="0">
+                <a:solidFill>
+                  <a:srgbClr val="92D050"/>
+                </a:solidFill>
+              </a:rPr>
+              <a:t>}</a:t>
+            </a:r>
+            <a:endParaRPr lang="en-US" sz="3600" dirty="0">
+              <a:solidFill>
+                <a:srgbClr val="92D050"/>
+              </a:solidFill>
+            </a:endParaRPr>
+          </a:p>
+        </p:txBody>
+      </p:sp>
+      <p:sp>
+        <p:nvSpPr>
+          <p:cNvPr id="10" name="TextBox 9"/>
+          <p:cNvSpPr txBox="1"/>
+          <p:nvPr/>
+        </p:nvSpPr>
+        <p:spPr>
+          <a:xfrm>
+            <a:off x="1408754" y="815258"/>
+            <a:ext cx="6771503" cy="369332"/>
+          </a:xfrm>
+          <a:prstGeom prst="rect">
+            <a:avLst/>
+          </a:prstGeom>
+          <a:noFill/>
+        </p:spPr>
+        <p:txBody>
+          <a:bodyPr wrap="square" rtlCol="0">
+            <a:spAutoFit/>
+          </a:bodyPr>
+          <a:lstStyle/>
+          <a:p>
+            <a:r>
+              <a:rPr lang="en-US" dirty="0" smtClean="0"/>
+              <a:t>~ </a:t>
+            </a:r>
+            <a:r>
+              <a:rPr lang="en-US" dirty="0" err="1" smtClean="0"/>
+              <a:t>System.Windows.Controls</a:t>
+            </a:r>
+            <a:endParaRPr lang="en-US" dirty="0" smtClean="0"/>
+          </a:p>
+        </p:txBody>
+      </p:sp>
+      <p:sp>
+        <p:nvSpPr>
+          <p:cNvPr id="11" name="TextBox 10"/>
+          <p:cNvSpPr txBox="1"/>
+          <p:nvPr/>
+        </p:nvSpPr>
+        <p:spPr>
+          <a:xfrm>
+            <a:off x="913795" y="1320109"/>
+            <a:ext cx="10337898" cy="646331"/>
+          </a:xfrm>
+          <a:prstGeom prst="rect">
+            <a:avLst/>
+          </a:prstGeom>
+          <a:noFill/>
+        </p:spPr>
+        <p:txBody>
+          <a:bodyPr wrap="square" rtlCol="0">
+            <a:spAutoFit/>
+          </a:bodyPr>
+          <a:lstStyle/>
+          <a:p>
+            <a:r>
+              <a:rPr lang="en-US" dirty="0" err="1"/>
+              <a:t>DockPanel</a:t>
+            </a:r>
+            <a:r>
+              <a:rPr lang="en-US" dirty="0"/>
+              <a:t> enables easy docking of elements to an entire side of the panel, stretching it to</a:t>
+            </a:r>
+          </a:p>
+          <a:p>
+            <a:r>
+              <a:rPr lang="en-US" dirty="0"/>
+              <a:t>fill the entire width or height.</a:t>
+            </a:r>
+            <a:endParaRPr lang="en-US" dirty="0"/>
+          </a:p>
+        </p:txBody>
+      </p:sp>
+      <p:sp>
+        <p:nvSpPr>
+          <p:cNvPr id="3" name="TextBox 2"/>
+          <p:cNvSpPr txBox="1"/>
+          <p:nvPr/>
+        </p:nvSpPr>
+        <p:spPr>
+          <a:xfrm>
+            <a:off x="913795" y="2101959"/>
+            <a:ext cx="4180115" cy="369332"/>
+          </a:xfrm>
+          <a:prstGeom prst="rect">
+            <a:avLst/>
+          </a:prstGeom>
+          <a:noFill/>
+        </p:spPr>
+        <p:txBody>
+          <a:bodyPr wrap="square" rtlCol="0">
+            <a:spAutoFit/>
+          </a:bodyPr>
+          <a:lstStyle/>
+          <a:p>
+            <a:r>
+              <a:rPr lang="en-US" b="1" dirty="0" err="1" smtClean="0"/>
+              <a:t>DockPanel.Dock</a:t>
+            </a:r>
+            <a:endParaRPr lang="en-US" dirty="0"/>
+          </a:p>
+        </p:txBody>
+      </p:sp>
+      <p:sp>
+        <p:nvSpPr>
+          <p:cNvPr id="2" name="TextBox 1"/>
+          <p:cNvSpPr txBox="1"/>
+          <p:nvPr/>
+        </p:nvSpPr>
+        <p:spPr>
+          <a:xfrm>
+            <a:off x="1175657" y="2471291"/>
+            <a:ext cx="3489649" cy="1200329"/>
+          </a:xfrm>
+          <a:prstGeom prst="rect">
+            <a:avLst/>
+          </a:prstGeom>
+          <a:noFill/>
+        </p:spPr>
+        <p:txBody>
+          <a:bodyPr wrap="square" rtlCol="0">
+            <a:spAutoFit/>
+          </a:bodyPr>
+          <a:lstStyle/>
+          <a:p>
+            <a:pPr marL="285750" indent="-285750">
+              <a:buFont typeface="Arial" panose="020B0604020202020204" pitchFamily="34" charset="0"/>
+              <a:buChar char="•"/>
+            </a:pPr>
+            <a:r>
+              <a:rPr lang="en-US" dirty="0" smtClean="0"/>
+              <a:t>Top</a:t>
+            </a:r>
+          </a:p>
+          <a:p>
+            <a:pPr marL="285750" indent="-285750">
+              <a:buFont typeface="Arial" panose="020B0604020202020204" pitchFamily="34" charset="0"/>
+              <a:buChar char="•"/>
+            </a:pPr>
+            <a:r>
+              <a:rPr lang="en-US" dirty="0" smtClean="0"/>
+              <a:t>Bottom</a:t>
+            </a:r>
+          </a:p>
+          <a:p>
+            <a:pPr marL="285750" indent="-285750">
+              <a:buFont typeface="Arial" panose="020B0604020202020204" pitchFamily="34" charset="0"/>
+              <a:buChar char="•"/>
+            </a:pPr>
+            <a:r>
+              <a:rPr lang="en-US" dirty="0" smtClean="0"/>
+              <a:t>Left</a:t>
+            </a:r>
+          </a:p>
+          <a:p>
+            <a:pPr marL="285750" indent="-285750">
+              <a:buFont typeface="Arial" panose="020B0604020202020204" pitchFamily="34" charset="0"/>
+              <a:buChar char="•"/>
+            </a:pPr>
+            <a:r>
+              <a:rPr lang="en-US" dirty="0" smtClean="0"/>
+              <a:t>Right</a:t>
+            </a:r>
+            <a:endParaRPr lang="en-US" dirty="0"/>
+          </a:p>
+        </p:txBody>
+      </p:sp>
+      <p:sp>
+        <p:nvSpPr>
+          <p:cNvPr id="7" name="TextBox 6"/>
+          <p:cNvSpPr txBox="1"/>
+          <p:nvPr/>
+        </p:nvSpPr>
+        <p:spPr>
+          <a:xfrm>
+            <a:off x="913795" y="3739020"/>
+            <a:ext cx="4814596" cy="369332"/>
+          </a:xfrm>
+          <a:prstGeom prst="rect">
+            <a:avLst/>
+          </a:prstGeom>
+          <a:noFill/>
+        </p:spPr>
+        <p:txBody>
+          <a:bodyPr wrap="square" rtlCol="0">
+            <a:spAutoFit/>
+          </a:bodyPr>
+          <a:lstStyle/>
+          <a:p>
+            <a:r>
+              <a:rPr lang="en-US" b="1" dirty="0" err="1"/>
+              <a:t>LastChildFill</a:t>
+            </a:r>
+            <a:endParaRPr lang="en-US" b="1" dirty="0"/>
+          </a:p>
+        </p:txBody>
+      </p:sp>
+      <p:sp>
+        <p:nvSpPr>
+          <p:cNvPr id="12" name="TextBox 11"/>
+          <p:cNvSpPr txBox="1"/>
+          <p:nvPr/>
+        </p:nvSpPr>
+        <p:spPr>
+          <a:xfrm>
+            <a:off x="1175657" y="4175752"/>
+            <a:ext cx="7940519" cy="369332"/>
+          </a:xfrm>
+          <a:prstGeom prst="rect">
+            <a:avLst/>
+          </a:prstGeom>
+          <a:noFill/>
+        </p:spPr>
+        <p:txBody>
+          <a:bodyPr wrap="square" rtlCol="0">
+            <a:spAutoFit/>
+          </a:bodyPr>
+          <a:lstStyle/>
+          <a:p>
+            <a:pPr marL="285750" indent="-285750">
+              <a:buFont typeface="Arial" panose="020B0604020202020204" pitchFamily="34" charset="0"/>
+              <a:buChar char="•"/>
+            </a:pPr>
+            <a:r>
+              <a:rPr lang="en-US" dirty="0" smtClean="0"/>
+              <a:t>When set </a:t>
+            </a:r>
+            <a:r>
+              <a:rPr lang="en-US" dirty="0"/>
+              <a:t>to true (the default), </a:t>
+            </a:r>
+            <a:r>
+              <a:rPr lang="en-US" dirty="0" smtClean="0"/>
+              <a:t>the last </a:t>
+            </a:r>
+            <a:r>
+              <a:rPr lang="en-US" dirty="0"/>
+              <a:t>child’s Dock setting is ignored.</a:t>
+            </a:r>
+            <a:endParaRPr lang="en-US" dirty="0"/>
+          </a:p>
+        </p:txBody>
+      </p:sp>
+    </p:spTree>
+    <p:extLst>
+      <p:ext uri="{BB962C8B-B14F-4D97-AF65-F5344CB8AC3E}">
+        <p14:creationId xmlns:p14="http://schemas.microsoft.com/office/powerpoint/2010/main" val="43589897"/>
+      </p:ext>
+    </p:extLst>
+  </p:cSld>
+  <p:clrMapOvr>
+    <a:masterClrMapping/>
+  </p:clrMapOvr>
+</p:sld>
+</file>
+
+<file path=ppt/slides/slide15.xml><?xml version="1.0" encoding="utf-8"?>
+<p:sld xmlns:a="http://schemas.openxmlformats.org/drawingml/2006/main" xmlns:r="http://schemas.openxmlformats.org/officeDocument/2006/relationships" xmlns:p="http://schemas.openxmlformats.org/presentationml/2006/main">
+  <p:cSld>
+    <p:spTree>
+      <p:nvGrpSpPr>
+        <p:cNvPr id="1" name=""/>
+        <p:cNvGrpSpPr/>
+        <p:nvPr/>
+      </p:nvGrpSpPr>
+      <p:grpSpPr>
+        <a:xfrm>
+          <a:off x="0" y="0"/>
+          <a:ext cx="0" cy="0"/>
+          <a:chOff x="0" y="0"/>
+          <a:chExt cx="0" cy="0"/>
+        </a:xfrm>
+      </p:grpSpPr>
+      <p:sp>
+        <p:nvSpPr>
+          <p:cNvPr id="4" name="Footer Placeholder 3"/>
+          <p:cNvSpPr>
+            <a:spLocks noGrp="1"/>
+          </p:cNvSpPr>
+          <p:nvPr>
+            <p:ph type="ftr" sz="quarter" idx="11"/>
+          </p:nvPr>
+        </p:nvSpPr>
+        <p:spPr>
+          <a:xfrm>
+            <a:off x="106486" y="6385783"/>
+            <a:ext cx="6672865" cy="365125"/>
+          </a:xfrm>
+        </p:spPr>
+        <p:txBody>
+          <a:bodyPr/>
+          <a:lstStyle/>
+          <a:p>
+            <a:r>
+              <a:rPr lang="fi-FI" sz="2000" dirty="0" smtClean="0"/>
+              <a:t>Tamas Santa - EPAM Systems - 2014</a:t>
+            </a:r>
+            <a:endParaRPr lang="en-US" sz="2000" dirty="0"/>
+          </a:p>
+        </p:txBody>
+      </p:sp>
+      <p:sp>
+        <p:nvSpPr>
+          <p:cNvPr id="5" name="TextBox 4"/>
+          <p:cNvSpPr txBox="1"/>
+          <p:nvPr/>
+        </p:nvSpPr>
+        <p:spPr>
+          <a:xfrm>
+            <a:off x="9020432" y="156519"/>
+            <a:ext cx="3072714" cy="338554"/>
+          </a:xfrm>
+          <a:prstGeom prst="rect">
+            <a:avLst/>
+          </a:prstGeom>
+          <a:noFill/>
+        </p:spPr>
+        <p:txBody>
+          <a:bodyPr wrap="square" rtlCol="0">
+            <a:spAutoFit/>
+          </a:bodyPr>
+          <a:lstStyle/>
+          <a:p>
+            <a:r>
+              <a:rPr lang="en-US" sz="1600" dirty="0" smtClean="0"/>
+              <a:t>Chapter 5 – Layout with Panels</a:t>
+            </a:r>
+            <a:endParaRPr lang="en-US" sz="1600" dirty="0"/>
+          </a:p>
+        </p:txBody>
+      </p:sp>
+      <p:sp>
+        <p:nvSpPr>
+          <p:cNvPr id="6" name="TextBox 5"/>
+          <p:cNvSpPr txBox="1"/>
+          <p:nvPr/>
+        </p:nvSpPr>
+        <p:spPr>
+          <a:xfrm>
+            <a:off x="913795" y="495073"/>
+            <a:ext cx="3171568" cy="369332"/>
+          </a:xfrm>
+          <a:prstGeom prst="rect">
+            <a:avLst/>
+          </a:prstGeom>
+          <a:noFill/>
+        </p:spPr>
+        <p:txBody>
+          <a:bodyPr wrap="square" rtlCol="0">
+            <a:spAutoFit/>
+          </a:bodyPr>
+          <a:lstStyle/>
+          <a:p>
+            <a:r>
+              <a:rPr lang="en-US" dirty="0" smtClean="0"/>
+              <a:t>Grid</a:t>
+            </a:r>
+            <a:endParaRPr lang="en-US" dirty="0"/>
+          </a:p>
+        </p:txBody>
+      </p:sp>
+      <p:sp>
+        <p:nvSpPr>
+          <p:cNvPr id="9" name="TextBox 8"/>
+          <p:cNvSpPr txBox="1"/>
+          <p:nvPr/>
+        </p:nvSpPr>
+        <p:spPr>
+          <a:xfrm rot="16200000">
+            <a:off x="-1035739" y="2943715"/>
+            <a:ext cx="3204516" cy="646331"/>
+          </a:xfrm>
+          <a:prstGeom prst="rect">
+            <a:avLst/>
+          </a:prstGeom>
+          <a:noFill/>
+        </p:spPr>
+        <p:txBody>
+          <a:bodyPr wrap="square" rtlCol="0">
+            <a:spAutoFit/>
+          </a:bodyPr>
+          <a:lstStyle/>
+          <a:p>
+            <a:r>
+              <a:rPr lang="en-US" sz="3600" dirty="0" smtClean="0">
+                <a:solidFill>
+                  <a:srgbClr val="92D050"/>
+                </a:solidFill>
+              </a:rPr>
+              <a:t>{</a:t>
+            </a:r>
+            <a:r>
+              <a:rPr lang="en-US" sz="3600" dirty="0" smtClean="0"/>
+              <a:t>Live Demo</a:t>
+            </a:r>
+            <a:r>
+              <a:rPr lang="en-US" sz="3600" dirty="0" smtClean="0">
+                <a:solidFill>
+                  <a:srgbClr val="92D050"/>
+                </a:solidFill>
+              </a:rPr>
+              <a:t>}</a:t>
+            </a:r>
+            <a:endParaRPr lang="en-US" sz="3600" dirty="0">
+              <a:solidFill>
+                <a:srgbClr val="92D050"/>
+              </a:solidFill>
+            </a:endParaRPr>
+          </a:p>
+        </p:txBody>
+      </p:sp>
+      <p:sp>
+        <p:nvSpPr>
+          <p:cNvPr id="10" name="TextBox 9"/>
+          <p:cNvSpPr txBox="1"/>
+          <p:nvPr/>
+        </p:nvSpPr>
+        <p:spPr>
+          <a:xfrm>
+            <a:off x="1408754" y="815258"/>
+            <a:ext cx="6771503" cy="369332"/>
+          </a:xfrm>
+          <a:prstGeom prst="rect">
+            <a:avLst/>
+          </a:prstGeom>
+          <a:noFill/>
+        </p:spPr>
+        <p:txBody>
+          <a:bodyPr wrap="square" rtlCol="0">
+            <a:spAutoFit/>
+          </a:bodyPr>
+          <a:lstStyle/>
+          <a:p>
+            <a:r>
+              <a:rPr lang="en-US" dirty="0" smtClean="0"/>
+              <a:t>~ </a:t>
+            </a:r>
+            <a:r>
+              <a:rPr lang="en-US" dirty="0" err="1" smtClean="0"/>
+              <a:t>System.Windows.Controls</a:t>
+            </a:r>
+            <a:endParaRPr lang="en-US" dirty="0" smtClean="0"/>
+          </a:p>
+        </p:txBody>
+      </p:sp>
+      <p:sp>
+        <p:nvSpPr>
+          <p:cNvPr id="11" name="TextBox 10"/>
+          <p:cNvSpPr txBox="1"/>
+          <p:nvPr/>
+        </p:nvSpPr>
+        <p:spPr>
+          <a:xfrm>
+            <a:off x="913795" y="1320109"/>
+            <a:ext cx="10337898" cy="646331"/>
+          </a:xfrm>
+          <a:prstGeom prst="rect">
+            <a:avLst/>
+          </a:prstGeom>
+          <a:noFill/>
+        </p:spPr>
+        <p:txBody>
+          <a:bodyPr wrap="square" rtlCol="0">
+            <a:spAutoFit/>
+          </a:bodyPr>
+          <a:lstStyle/>
+          <a:p>
+            <a:r>
+              <a:rPr lang="en-US" dirty="0"/>
+              <a:t>It enables you to arrange </a:t>
+            </a:r>
+            <a:r>
+              <a:rPr lang="en-US" dirty="0" smtClean="0"/>
+              <a:t>its children </a:t>
+            </a:r>
+            <a:r>
+              <a:rPr lang="en-US" dirty="0"/>
+              <a:t>in a </a:t>
+            </a:r>
+            <a:r>
+              <a:rPr lang="en-US" dirty="0" err="1"/>
+              <a:t>multirow</a:t>
+            </a:r>
+            <a:r>
+              <a:rPr lang="en-US" dirty="0"/>
+              <a:t> and multicolumn fashion, without relying on </a:t>
+            </a:r>
+            <a:r>
+              <a:rPr lang="en-US" dirty="0" smtClean="0"/>
+              <a:t>wrapping.</a:t>
+            </a:r>
+            <a:endParaRPr lang="en-US" dirty="0"/>
+          </a:p>
+        </p:txBody>
+      </p:sp>
+      <p:sp>
+        <p:nvSpPr>
+          <p:cNvPr id="8" name="TextBox 7"/>
+          <p:cNvSpPr txBox="1"/>
+          <p:nvPr/>
+        </p:nvSpPr>
+        <p:spPr>
+          <a:xfrm>
+            <a:off x="1315449" y="3826923"/>
+            <a:ext cx="2827176" cy="369332"/>
+          </a:xfrm>
+          <a:prstGeom prst="rect">
+            <a:avLst/>
+          </a:prstGeom>
+          <a:noFill/>
+        </p:spPr>
+        <p:txBody>
+          <a:bodyPr wrap="square" rtlCol="0">
+            <a:spAutoFit/>
+          </a:bodyPr>
+          <a:lstStyle/>
+          <a:p>
+            <a:r>
+              <a:rPr lang="en-US" dirty="0" err="1" smtClean="0"/>
+              <a:t>Grid.RowDefinitions</a:t>
+            </a:r>
+            <a:endParaRPr lang="en-US" dirty="0"/>
+          </a:p>
+        </p:txBody>
+      </p:sp>
+      <p:sp>
+        <p:nvSpPr>
+          <p:cNvPr id="13" name="TextBox 12"/>
+          <p:cNvSpPr txBox="1"/>
+          <p:nvPr/>
+        </p:nvSpPr>
+        <p:spPr>
+          <a:xfrm>
+            <a:off x="1315449" y="4160069"/>
+            <a:ext cx="2920481" cy="369332"/>
+          </a:xfrm>
+          <a:prstGeom prst="rect">
+            <a:avLst/>
+          </a:prstGeom>
+          <a:noFill/>
+        </p:spPr>
+        <p:txBody>
+          <a:bodyPr wrap="square" rtlCol="0">
+            <a:spAutoFit/>
+          </a:bodyPr>
+          <a:lstStyle/>
+          <a:p>
+            <a:r>
+              <a:rPr lang="en-US" dirty="0" err="1" smtClean="0"/>
+              <a:t>Grid.ColumnDefinitions</a:t>
+            </a:r>
+            <a:endParaRPr lang="en-US" dirty="0"/>
+          </a:p>
+        </p:txBody>
+      </p:sp>
+      <p:sp>
+        <p:nvSpPr>
+          <p:cNvPr id="14" name="TextBox 13"/>
+          <p:cNvSpPr txBox="1"/>
+          <p:nvPr/>
+        </p:nvSpPr>
+        <p:spPr>
+          <a:xfrm>
+            <a:off x="1315448" y="2513675"/>
+            <a:ext cx="2817845" cy="369332"/>
+          </a:xfrm>
+          <a:prstGeom prst="rect">
+            <a:avLst/>
+          </a:prstGeom>
+          <a:noFill/>
+        </p:spPr>
+        <p:txBody>
+          <a:bodyPr wrap="square" rtlCol="0">
+            <a:spAutoFit/>
+          </a:bodyPr>
+          <a:lstStyle/>
+          <a:p>
+            <a:r>
+              <a:rPr lang="en-US" dirty="0" err="1" smtClean="0"/>
+              <a:t>Grid.Row</a:t>
+            </a:r>
+            <a:endParaRPr lang="en-US" dirty="0"/>
+          </a:p>
+        </p:txBody>
+      </p:sp>
+      <p:sp>
+        <p:nvSpPr>
+          <p:cNvPr id="15" name="TextBox 14"/>
+          <p:cNvSpPr txBox="1"/>
+          <p:nvPr/>
+        </p:nvSpPr>
+        <p:spPr>
+          <a:xfrm>
+            <a:off x="1315448" y="2836872"/>
+            <a:ext cx="2920482" cy="369332"/>
+          </a:xfrm>
+          <a:prstGeom prst="rect">
+            <a:avLst/>
+          </a:prstGeom>
+          <a:noFill/>
+        </p:spPr>
+        <p:txBody>
+          <a:bodyPr wrap="square" rtlCol="0">
+            <a:spAutoFit/>
+          </a:bodyPr>
+          <a:lstStyle/>
+          <a:p>
+            <a:r>
+              <a:rPr lang="en-US" dirty="0" err="1" smtClean="0"/>
+              <a:t>Grid.Column</a:t>
+            </a:r>
+            <a:endParaRPr lang="en-US" dirty="0"/>
+          </a:p>
+        </p:txBody>
+      </p:sp>
+      <p:sp>
+        <p:nvSpPr>
+          <p:cNvPr id="16" name="TextBox 15"/>
+          <p:cNvSpPr txBox="1"/>
+          <p:nvPr/>
+        </p:nvSpPr>
+        <p:spPr>
+          <a:xfrm>
+            <a:off x="1315448" y="3156554"/>
+            <a:ext cx="2631233" cy="369332"/>
+          </a:xfrm>
+          <a:prstGeom prst="rect">
+            <a:avLst/>
+          </a:prstGeom>
+          <a:noFill/>
+        </p:spPr>
+        <p:txBody>
+          <a:bodyPr wrap="square" rtlCol="0">
+            <a:spAutoFit/>
+          </a:bodyPr>
+          <a:lstStyle/>
+          <a:p>
+            <a:r>
+              <a:rPr lang="en-US" dirty="0" err="1" smtClean="0"/>
+              <a:t>Grid.ColumnSpan</a:t>
+            </a:r>
+            <a:endParaRPr lang="en-US" dirty="0"/>
+          </a:p>
+        </p:txBody>
+      </p:sp>
+      <p:sp>
+        <p:nvSpPr>
+          <p:cNvPr id="17" name="TextBox 16"/>
+          <p:cNvSpPr txBox="1"/>
+          <p:nvPr/>
+        </p:nvSpPr>
+        <p:spPr>
+          <a:xfrm>
+            <a:off x="1315448" y="3499875"/>
+            <a:ext cx="2920482" cy="369332"/>
+          </a:xfrm>
+          <a:prstGeom prst="rect">
+            <a:avLst/>
+          </a:prstGeom>
+          <a:noFill/>
+        </p:spPr>
+        <p:txBody>
+          <a:bodyPr wrap="square" rtlCol="0">
+            <a:spAutoFit/>
+          </a:bodyPr>
+          <a:lstStyle/>
+          <a:p>
+            <a:r>
+              <a:rPr lang="en-US" dirty="0" err="1" smtClean="0"/>
+              <a:t>Grid.RowSpan</a:t>
+            </a:r>
+            <a:endParaRPr lang="en-US" dirty="0"/>
+          </a:p>
+        </p:txBody>
+      </p:sp>
+      <p:sp>
+        <p:nvSpPr>
+          <p:cNvPr id="18" name="TextBox 17"/>
+          <p:cNvSpPr txBox="1"/>
+          <p:nvPr/>
+        </p:nvSpPr>
+        <p:spPr>
+          <a:xfrm>
+            <a:off x="7730805" y="2018957"/>
+            <a:ext cx="2579253" cy="369332"/>
+          </a:xfrm>
+          <a:prstGeom prst="rect">
+            <a:avLst/>
+          </a:prstGeom>
+          <a:solidFill>
+            <a:schemeClr val="bg1"/>
+          </a:solidFill>
+          <a:ln w="12700">
+            <a:solidFill>
+              <a:schemeClr val="accent1"/>
+            </a:solidFill>
+          </a:ln>
+        </p:spPr>
+        <p:txBody>
+          <a:bodyPr wrap="square" rtlCol="0">
+            <a:spAutoFit/>
+          </a:bodyPr>
+          <a:lstStyle/>
+          <a:p>
+            <a:r>
+              <a:rPr lang="en-US" dirty="0" err="1"/>
+              <a:t>ShowGridLines</a:t>
+            </a:r>
+            <a:r>
+              <a:rPr lang="en-US" dirty="0"/>
+              <a:t>="True"</a:t>
+            </a:r>
+            <a:endParaRPr lang="en-US" dirty="0"/>
+          </a:p>
+        </p:txBody>
+      </p:sp>
+      <p:sp>
+        <p:nvSpPr>
+          <p:cNvPr id="19" name="TextBox 18"/>
+          <p:cNvSpPr txBox="1"/>
+          <p:nvPr/>
+        </p:nvSpPr>
+        <p:spPr>
+          <a:xfrm>
+            <a:off x="1082351" y="4531268"/>
+            <a:ext cx="2621902" cy="369332"/>
+          </a:xfrm>
+          <a:prstGeom prst="rect">
+            <a:avLst/>
+          </a:prstGeom>
+          <a:noFill/>
+        </p:spPr>
+        <p:txBody>
+          <a:bodyPr wrap="square" rtlCol="0">
+            <a:spAutoFit/>
+          </a:bodyPr>
+          <a:lstStyle/>
+          <a:p>
+            <a:r>
+              <a:rPr lang="en-US" dirty="0" smtClean="0"/>
+              <a:t>Sizing</a:t>
+            </a:r>
+            <a:endParaRPr lang="en-US" dirty="0"/>
+          </a:p>
+        </p:txBody>
+      </p:sp>
+      <p:sp>
+        <p:nvSpPr>
+          <p:cNvPr id="20" name="TextBox 19"/>
+          <p:cNvSpPr txBox="1"/>
+          <p:nvPr/>
+        </p:nvSpPr>
+        <p:spPr>
+          <a:xfrm>
+            <a:off x="1315448" y="4850950"/>
+            <a:ext cx="3760405" cy="923330"/>
+          </a:xfrm>
+          <a:prstGeom prst="rect">
+            <a:avLst/>
+          </a:prstGeom>
+          <a:noFill/>
+        </p:spPr>
+        <p:txBody>
+          <a:bodyPr wrap="square" rtlCol="0">
+            <a:spAutoFit/>
+          </a:bodyPr>
+          <a:lstStyle/>
+          <a:p>
+            <a:pPr marL="285750" indent="-285750">
+              <a:buFont typeface="Arial" panose="020B0604020202020204" pitchFamily="34" charset="0"/>
+              <a:buChar char="•"/>
+            </a:pPr>
+            <a:r>
+              <a:rPr lang="en-US" dirty="0" smtClean="0"/>
+              <a:t>Absolute – Width=“500”</a:t>
+            </a:r>
+          </a:p>
+          <a:p>
+            <a:pPr marL="285750" indent="-285750">
+              <a:buFont typeface="Arial" panose="020B0604020202020204" pitchFamily="34" charset="0"/>
+              <a:buChar char="•"/>
+            </a:pPr>
+            <a:r>
+              <a:rPr lang="en-US" dirty="0" smtClean="0"/>
+              <a:t>Auto – Width=“Auto”</a:t>
+            </a:r>
+          </a:p>
+          <a:p>
+            <a:pPr marL="285750" indent="-285750">
+              <a:buFont typeface="Arial" panose="020B0604020202020204" pitchFamily="34" charset="0"/>
+              <a:buChar char="•"/>
+            </a:pPr>
+            <a:r>
+              <a:rPr lang="en-US" dirty="0" smtClean="0"/>
+              <a:t>Proportional – Width=“2*”</a:t>
+            </a:r>
+            <a:endParaRPr lang="en-US" dirty="0"/>
+          </a:p>
+        </p:txBody>
+      </p:sp>
+      <p:sp>
+        <p:nvSpPr>
+          <p:cNvPr id="21" name="TextBox 20"/>
+          <p:cNvSpPr txBox="1"/>
+          <p:nvPr/>
+        </p:nvSpPr>
+        <p:spPr>
+          <a:xfrm>
+            <a:off x="1082351" y="2127380"/>
+            <a:ext cx="3536302" cy="369332"/>
+          </a:xfrm>
+          <a:prstGeom prst="rect">
+            <a:avLst/>
+          </a:prstGeom>
+          <a:noFill/>
+        </p:spPr>
+        <p:txBody>
+          <a:bodyPr wrap="square" rtlCol="0">
+            <a:spAutoFit/>
+          </a:bodyPr>
+          <a:lstStyle/>
+          <a:p>
+            <a:r>
+              <a:rPr lang="en-US" dirty="0" smtClean="0"/>
+              <a:t>Attached Properties</a:t>
+            </a:r>
+          </a:p>
+        </p:txBody>
+      </p:sp>
+      <p:sp>
+        <p:nvSpPr>
+          <p:cNvPr id="22" name="Right Arrow 21"/>
+          <p:cNvSpPr/>
+          <p:nvPr/>
+        </p:nvSpPr>
+        <p:spPr>
+          <a:xfrm>
+            <a:off x="4683967" y="5062138"/>
+            <a:ext cx="2239347" cy="443476"/>
+          </a:xfrm>
+          <a:prstGeom prst="rightArrow">
+            <a:avLst/>
+          </a:prstGeom>
+        </p:spPr>
+        <p:style>
+          <a:lnRef idx="2">
+            <a:schemeClr val="accent1">
+              <a:shade val="50000"/>
+            </a:schemeClr>
+          </a:lnRef>
+          <a:fillRef idx="1">
+            <a:schemeClr val="accent1"/>
+          </a:fillRef>
+          <a:effectRef idx="0">
+            <a:schemeClr val="accent1"/>
+          </a:effectRef>
+          <a:fontRef idx="minor">
+            <a:schemeClr val="lt1"/>
+          </a:fontRef>
+        </p:style>
+        <p:txBody>
+          <a:bodyPr rtlCol="0" anchor="ctr"/>
+          <a:lstStyle/>
+          <a:p>
+            <a:pPr algn="ctr"/>
+            <a:endParaRPr lang="en-US"/>
+          </a:p>
+        </p:txBody>
+      </p:sp>
+      <p:sp>
+        <p:nvSpPr>
+          <p:cNvPr id="23" name="TextBox 22"/>
+          <p:cNvSpPr txBox="1"/>
+          <p:nvPr/>
+        </p:nvSpPr>
+        <p:spPr>
+          <a:xfrm>
+            <a:off x="7212564" y="4960710"/>
+            <a:ext cx="2943009" cy="646331"/>
+          </a:xfrm>
+          <a:prstGeom prst="rect">
+            <a:avLst/>
+          </a:prstGeom>
+          <a:noFill/>
+        </p:spPr>
+        <p:txBody>
+          <a:bodyPr wrap="square" rtlCol="0">
+            <a:spAutoFit/>
+          </a:bodyPr>
+          <a:lstStyle/>
+          <a:p>
+            <a:r>
+              <a:rPr lang="en-US" dirty="0" smtClean="0"/>
+              <a:t>Interactive Sizing with </a:t>
+            </a:r>
+            <a:r>
+              <a:rPr lang="en-US" dirty="0" err="1" smtClean="0"/>
+              <a:t>GridSplitter</a:t>
+            </a:r>
+            <a:endParaRPr lang="en-US" dirty="0"/>
+          </a:p>
+        </p:txBody>
+      </p:sp>
+    </p:spTree>
+    <p:extLst>
+      <p:ext uri="{BB962C8B-B14F-4D97-AF65-F5344CB8AC3E}">
+        <p14:creationId xmlns:p14="http://schemas.microsoft.com/office/powerpoint/2010/main" val="1464950570"/>
+      </p:ext>
+    </p:extLst>
+  </p:cSld>
+  <p:clrMapOvr>
+    <a:masterClrMapping/>
+  </p:clrMapOvr>
+</p:sld>
+</file>
+
+<file path=ppt/slides/slide16.xml><?xml version="1.0" encoding="utf-8"?>
+<p:sld xmlns:a="http://schemas.openxmlformats.org/drawingml/2006/main" xmlns:r="http://schemas.openxmlformats.org/officeDocument/2006/relationships" xmlns:p="http://schemas.openxmlformats.org/presentationml/2006/main">
+  <p:cSld>
+    <p:spTree>
+      <p:nvGrpSpPr>
+        <p:cNvPr id="1" name=""/>
+        <p:cNvGrpSpPr/>
+        <p:nvPr/>
+      </p:nvGrpSpPr>
+      <p:grpSpPr>
+        <a:xfrm>
+          <a:off x="0" y="0"/>
+          <a:ext cx="0" cy="0"/>
+          <a:chOff x="0" y="0"/>
+          <a:chExt cx="0" cy="0"/>
+        </a:xfrm>
+      </p:grpSpPr>
+      <p:sp>
+        <p:nvSpPr>
+          <p:cNvPr id="4" name="Footer Placeholder 3"/>
+          <p:cNvSpPr>
+            <a:spLocks noGrp="1"/>
+          </p:cNvSpPr>
+          <p:nvPr>
+            <p:ph type="ftr" sz="quarter" idx="11"/>
+          </p:nvPr>
+        </p:nvSpPr>
+        <p:spPr>
+          <a:xfrm>
+            <a:off x="106486" y="6385783"/>
+            <a:ext cx="6672865" cy="365125"/>
+          </a:xfrm>
+        </p:spPr>
+        <p:txBody>
+          <a:bodyPr/>
+          <a:lstStyle/>
+          <a:p>
+            <a:r>
+              <a:rPr lang="fi-FI" sz="2000" dirty="0" smtClean="0"/>
+              <a:t>Tamas Santa - EPAM Systems - 2014</a:t>
+            </a:r>
+            <a:endParaRPr lang="en-US" sz="2000" dirty="0"/>
+          </a:p>
+        </p:txBody>
+      </p:sp>
+      <p:sp>
+        <p:nvSpPr>
+          <p:cNvPr id="5" name="TextBox 4"/>
+          <p:cNvSpPr txBox="1"/>
+          <p:nvPr/>
+        </p:nvSpPr>
+        <p:spPr>
+          <a:xfrm>
+            <a:off x="9020432" y="156519"/>
+            <a:ext cx="3072714" cy="338554"/>
+          </a:xfrm>
+          <a:prstGeom prst="rect">
+            <a:avLst/>
+          </a:prstGeom>
+          <a:noFill/>
+        </p:spPr>
+        <p:txBody>
+          <a:bodyPr wrap="square" rtlCol="0">
+            <a:spAutoFit/>
+          </a:bodyPr>
+          <a:lstStyle/>
+          <a:p>
+            <a:r>
+              <a:rPr lang="en-US" sz="1600" dirty="0" smtClean="0"/>
+              <a:t>Chapter 5 – Layout with Panels</a:t>
+            </a:r>
+            <a:endParaRPr lang="en-US" sz="1600" dirty="0"/>
+          </a:p>
+        </p:txBody>
+      </p:sp>
+      <p:sp>
+        <p:nvSpPr>
+          <p:cNvPr id="6" name="TextBox 5"/>
+          <p:cNvSpPr txBox="1"/>
+          <p:nvPr/>
+        </p:nvSpPr>
+        <p:spPr>
+          <a:xfrm>
+            <a:off x="913795" y="495073"/>
+            <a:ext cx="3171568" cy="369332"/>
+          </a:xfrm>
+          <a:prstGeom prst="rect">
+            <a:avLst/>
+          </a:prstGeom>
+          <a:noFill/>
+        </p:spPr>
+        <p:txBody>
+          <a:bodyPr wrap="square" rtlCol="0">
+            <a:spAutoFit/>
+          </a:bodyPr>
+          <a:lstStyle/>
+          <a:p>
+            <a:r>
+              <a:rPr lang="en-US" dirty="0" smtClean="0"/>
+              <a:t>Primitive Panels</a:t>
+            </a:r>
+            <a:endParaRPr lang="en-US" dirty="0"/>
+          </a:p>
+        </p:txBody>
+      </p:sp>
+      <p:sp>
+        <p:nvSpPr>
+          <p:cNvPr id="9" name="TextBox 8"/>
+          <p:cNvSpPr txBox="1"/>
+          <p:nvPr/>
+        </p:nvSpPr>
+        <p:spPr>
+          <a:xfrm rot="16200000">
+            <a:off x="-1035739" y="2943715"/>
+            <a:ext cx="3204516" cy="646331"/>
+          </a:xfrm>
+          <a:prstGeom prst="rect">
+            <a:avLst/>
+          </a:prstGeom>
+          <a:noFill/>
+        </p:spPr>
+        <p:txBody>
+          <a:bodyPr wrap="square" rtlCol="0">
+            <a:spAutoFit/>
+          </a:bodyPr>
+          <a:lstStyle/>
+          <a:p>
+            <a:r>
+              <a:rPr lang="en-US" sz="3600" dirty="0" smtClean="0">
+                <a:solidFill>
+                  <a:srgbClr val="92D050"/>
+                </a:solidFill>
+              </a:rPr>
+              <a:t>{</a:t>
+            </a:r>
+            <a:r>
+              <a:rPr lang="en-US" sz="3600" dirty="0" smtClean="0"/>
+              <a:t>Live Demo</a:t>
+            </a:r>
+            <a:r>
+              <a:rPr lang="en-US" sz="3600" dirty="0" smtClean="0">
+                <a:solidFill>
+                  <a:srgbClr val="92D050"/>
+                </a:solidFill>
+              </a:rPr>
+              <a:t>}</a:t>
+            </a:r>
+            <a:endParaRPr lang="en-US" sz="3600" dirty="0">
+              <a:solidFill>
+                <a:srgbClr val="92D050"/>
+              </a:solidFill>
+            </a:endParaRPr>
+          </a:p>
+        </p:txBody>
+      </p:sp>
+      <p:sp>
+        <p:nvSpPr>
+          <p:cNvPr id="10" name="TextBox 9"/>
+          <p:cNvSpPr txBox="1"/>
+          <p:nvPr/>
+        </p:nvSpPr>
+        <p:spPr>
+          <a:xfrm>
+            <a:off x="1408754" y="815258"/>
+            <a:ext cx="6771503" cy="369332"/>
+          </a:xfrm>
+          <a:prstGeom prst="rect">
+            <a:avLst/>
+          </a:prstGeom>
+          <a:noFill/>
+        </p:spPr>
+        <p:txBody>
+          <a:bodyPr wrap="square" rtlCol="0">
+            <a:spAutoFit/>
+          </a:bodyPr>
+          <a:lstStyle/>
+          <a:p>
+            <a:r>
+              <a:rPr lang="en-US" dirty="0" smtClean="0"/>
+              <a:t>~ </a:t>
+            </a:r>
+            <a:r>
+              <a:rPr lang="en-US" dirty="0" err="1" smtClean="0"/>
+              <a:t>System.Windows.Controls</a:t>
+            </a:r>
+            <a:endParaRPr lang="en-US" dirty="0" smtClean="0"/>
+          </a:p>
+        </p:txBody>
+      </p:sp>
+      <p:sp>
+        <p:nvSpPr>
+          <p:cNvPr id="2" name="TextBox 1"/>
+          <p:cNvSpPr txBox="1"/>
+          <p:nvPr/>
+        </p:nvSpPr>
+        <p:spPr>
+          <a:xfrm>
+            <a:off x="1035698" y="1455576"/>
+            <a:ext cx="2286000" cy="369332"/>
+          </a:xfrm>
+          <a:prstGeom prst="rect">
+            <a:avLst/>
+          </a:prstGeom>
+          <a:noFill/>
+        </p:spPr>
+        <p:txBody>
+          <a:bodyPr wrap="square" rtlCol="0">
+            <a:spAutoFit/>
+          </a:bodyPr>
+          <a:lstStyle/>
+          <a:p>
+            <a:r>
+              <a:rPr lang="en-US" b="1" dirty="0" err="1"/>
+              <a:t>TabPanel</a:t>
+            </a:r>
+            <a:endParaRPr lang="en-US" dirty="0"/>
+          </a:p>
+        </p:txBody>
+      </p:sp>
+      <p:sp>
+        <p:nvSpPr>
+          <p:cNvPr id="3" name="TextBox 2"/>
+          <p:cNvSpPr txBox="1"/>
+          <p:nvPr/>
+        </p:nvSpPr>
+        <p:spPr>
+          <a:xfrm>
+            <a:off x="1035698" y="1940767"/>
+            <a:ext cx="2192694" cy="369332"/>
+          </a:xfrm>
+          <a:prstGeom prst="rect">
+            <a:avLst/>
+          </a:prstGeom>
+          <a:noFill/>
+        </p:spPr>
+        <p:txBody>
+          <a:bodyPr wrap="square" rtlCol="0">
+            <a:spAutoFit/>
+          </a:bodyPr>
+          <a:lstStyle/>
+          <a:p>
+            <a:r>
+              <a:rPr lang="en-US" b="1" dirty="0" err="1"/>
+              <a:t>ToolBarPanel</a:t>
+            </a:r>
+            <a:endParaRPr lang="en-US" dirty="0"/>
+          </a:p>
+        </p:txBody>
+      </p:sp>
+      <p:sp>
+        <p:nvSpPr>
+          <p:cNvPr id="7" name="TextBox 6"/>
+          <p:cNvSpPr txBox="1"/>
+          <p:nvPr/>
+        </p:nvSpPr>
+        <p:spPr>
+          <a:xfrm>
+            <a:off x="1035698" y="2407298"/>
+            <a:ext cx="3228392" cy="369332"/>
+          </a:xfrm>
+          <a:prstGeom prst="rect">
+            <a:avLst/>
+          </a:prstGeom>
+          <a:noFill/>
+        </p:spPr>
+        <p:txBody>
+          <a:bodyPr wrap="square" rtlCol="0">
+            <a:spAutoFit/>
+          </a:bodyPr>
+          <a:lstStyle/>
+          <a:p>
+            <a:r>
+              <a:rPr lang="en-US" b="1" dirty="0" err="1"/>
+              <a:t>ToolBarOverflowPanel</a:t>
+            </a:r>
+            <a:endParaRPr lang="en-US" dirty="0"/>
+          </a:p>
+        </p:txBody>
+      </p:sp>
+      <p:sp>
+        <p:nvSpPr>
+          <p:cNvPr id="12" name="TextBox 11"/>
+          <p:cNvSpPr txBox="1"/>
+          <p:nvPr/>
+        </p:nvSpPr>
+        <p:spPr>
+          <a:xfrm>
+            <a:off x="1035698" y="3060441"/>
+            <a:ext cx="2779077" cy="369332"/>
+          </a:xfrm>
+          <a:prstGeom prst="rect">
+            <a:avLst/>
+          </a:prstGeom>
+          <a:noFill/>
+        </p:spPr>
+        <p:txBody>
+          <a:bodyPr wrap="square" rtlCol="0">
+            <a:spAutoFit/>
+          </a:bodyPr>
+          <a:lstStyle/>
+          <a:p>
+            <a:r>
+              <a:rPr lang="en-US" b="1" dirty="0" err="1"/>
+              <a:t>ToolBarTray</a:t>
+            </a:r>
+            <a:endParaRPr lang="en-US" dirty="0"/>
+          </a:p>
+        </p:txBody>
+      </p:sp>
+      <p:sp>
+        <p:nvSpPr>
+          <p:cNvPr id="24" name="TextBox 23"/>
+          <p:cNvSpPr txBox="1"/>
+          <p:nvPr/>
+        </p:nvSpPr>
+        <p:spPr>
+          <a:xfrm>
+            <a:off x="1035698" y="3610947"/>
+            <a:ext cx="3470988" cy="369332"/>
+          </a:xfrm>
+          <a:prstGeom prst="rect">
+            <a:avLst/>
+          </a:prstGeom>
+          <a:noFill/>
+        </p:spPr>
+        <p:txBody>
+          <a:bodyPr wrap="square" rtlCol="0">
+            <a:spAutoFit/>
+          </a:bodyPr>
+          <a:lstStyle/>
+          <a:p>
+            <a:r>
+              <a:rPr lang="en-US" b="1" dirty="0" err="1"/>
+              <a:t>UniformGrid</a:t>
+            </a:r>
+            <a:endParaRPr lang="en-US" dirty="0"/>
+          </a:p>
+        </p:txBody>
+      </p:sp>
+      <p:sp>
+        <p:nvSpPr>
+          <p:cNvPr id="25" name="TextBox 24"/>
+          <p:cNvSpPr txBox="1"/>
+          <p:nvPr/>
+        </p:nvSpPr>
+        <p:spPr>
+          <a:xfrm>
+            <a:off x="1035698" y="4105469"/>
+            <a:ext cx="2863053" cy="369332"/>
+          </a:xfrm>
+          <a:prstGeom prst="rect">
+            <a:avLst/>
+          </a:prstGeom>
+          <a:noFill/>
+        </p:spPr>
+        <p:txBody>
+          <a:bodyPr wrap="square" rtlCol="0">
+            <a:spAutoFit/>
+          </a:bodyPr>
+          <a:lstStyle/>
+          <a:p>
+            <a:r>
+              <a:rPr lang="en-US" b="1" dirty="0" err="1"/>
+              <a:t>SelectiveScrollingGrid</a:t>
+            </a:r>
+            <a:endParaRPr lang="en-US" dirty="0"/>
+          </a:p>
+        </p:txBody>
+      </p:sp>
+    </p:spTree>
+    <p:extLst>
+      <p:ext uri="{BB962C8B-B14F-4D97-AF65-F5344CB8AC3E}">
+        <p14:creationId xmlns:p14="http://schemas.microsoft.com/office/powerpoint/2010/main" val="517618792"/>
+      </p:ext>
+    </p:extLst>
+  </p:cSld>
+  <p:clrMapOvr>
+    <a:masterClrMapping/>
+  </p:clrMapOvr>
+</p:sld>
+</file>
+
+<file path=ppt/slides/slide17.xml><?xml version="1.0" encoding="utf-8"?>
+<p:sld xmlns:a="http://schemas.openxmlformats.org/drawingml/2006/main" xmlns:r="http://schemas.openxmlformats.org/officeDocument/2006/relationships" xmlns:p="http://schemas.openxmlformats.org/presentationml/2006/main">
+  <p:cSld>
+    <p:spTree>
+      <p:nvGrpSpPr>
+        <p:cNvPr id="1" name=""/>
+        <p:cNvGrpSpPr/>
+        <p:nvPr/>
+      </p:nvGrpSpPr>
+      <p:grpSpPr>
+        <a:xfrm>
+          <a:off x="0" y="0"/>
+          <a:ext cx="0" cy="0"/>
+          <a:chOff x="0" y="0"/>
+          <a:chExt cx="0" cy="0"/>
+        </a:xfrm>
+      </p:grpSpPr>
+      <p:sp>
+        <p:nvSpPr>
+          <p:cNvPr id="4" name="Footer Placeholder 3"/>
+          <p:cNvSpPr>
+            <a:spLocks noGrp="1"/>
+          </p:cNvSpPr>
+          <p:nvPr>
+            <p:ph type="ftr" sz="quarter" idx="11"/>
+          </p:nvPr>
+        </p:nvSpPr>
+        <p:spPr>
+          <a:xfrm>
+            <a:off x="106486" y="6385783"/>
+            <a:ext cx="6672865" cy="365125"/>
+          </a:xfrm>
+        </p:spPr>
+        <p:txBody>
+          <a:bodyPr/>
+          <a:lstStyle/>
+          <a:p>
+            <a:r>
+              <a:rPr lang="fi-FI" sz="2000" dirty="0" smtClean="0"/>
+              <a:t>Tamas Santa - EPAM Systems - 2014</a:t>
+            </a:r>
+            <a:endParaRPr lang="en-US" sz="2000" dirty="0"/>
+          </a:p>
+        </p:txBody>
+      </p:sp>
+      <p:sp>
+        <p:nvSpPr>
+          <p:cNvPr id="5" name="TextBox 4"/>
+          <p:cNvSpPr txBox="1"/>
+          <p:nvPr/>
+        </p:nvSpPr>
+        <p:spPr>
+          <a:xfrm>
+            <a:off x="9020432" y="156519"/>
+            <a:ext cx="3072714" cy="338554"/>
+          </a:xfrm>
+          <a:prstGeom prst="rect">
+            <a:avLst/>
+          </a:prstGeom>
+          <a:noFill/>
+        </p:spPr>
+        <p:txBody>
+          <a:bodyPr wrap="square" rtlCol="0">
+            <a:spAutoFit/>
+          </a:bodyPr>
+          <a:lstStyle/>
+          <a:p>
+            <a:r>
+              <a:rPr lang="en-US" sz="1600" dirty="0" smtClean="0"/>
+              <a:t>Chapter 5 – Layout with Panels</a:t>
+            </a:r>
+            <a:endParaRPr lang="en-US" sz="1600" dirty="0"/>
+          </a:p>
+        </p:txBody>
+      </p:sp>
+      <p:sp>
+        <p:nvSpPr>
+          <p:cNvPr id="6" name="TextBox 5"/>
+          <p:cNvSpPr txBox="1"/>
+          <p:nvPr/>
+        </p:nvSpPr>
+        <p:spPr>
+          <a:xfrm>
+            <a:off x="913795" y="495073"/>
+            <a:ext cx="3171568" cy="369332"/>
+          </a:xfrm>
+          <a:prstGeom prst="rect">
+            <a:avLst/>
+          </a:prstGeom>
+          <a:noFill/>
+        </p:spPr>
+        <p:txBody>
+          <a:bodyPr wrap="square" rtlCol="0">
+            <a:spAutoFit/>
+          </a:bodyPr>
+          <a:lstStyle/>
+          <a:p>
+            <a:r>
+              <a:rPr lang="en-US" dirty="0" smtClean="0"/>
+              <a:t>Handling Content Overflow</a:t>
+            </a:r>
+            <a:endParaRPr lang="en-US" dirty="0"/>
+          </a:p>
+        </p:txBody>
+      </p:sp>
+      <p:sp>
+        <p:nvSpPr>
+          <p:cNvPr id="9" name="TextBox 8"/>
+          <p:cNvSpPr txBox="1"/>
+          <p:nvPr/>
+        </p:nvSpPr>
+        <p:spPr>
+          <a:xfrm rot="16200000">
+            <a:off x="-1035739" y="2943715"/>
+            <a:ext cx="3204516" cy="646331"/>
+          </a:xfrm>
+          <a:prstGeom prst="rect">
+            <a:avLst/>
+          </a:prstGeom>
+          <a:noFill/>
+        </p:spPr>
+        <p:txBody>
+          <a:bodyPr wrap="square" rtlCol="0">
+            <a:spAutoFit/>
+          </a:bodyPr>
+          <a:lstStyle/>
+          <a:p>
+            <a:r>
+              <a:rPr lang="en-US" sz="3600" dirty="0" smtClean="0">
+                <a:solidFill>
+                  <a:srgbClr val="92D050"/>
+                </a:solidFill>
+              </a:rPr>
+              <a:t>{</a:t>
+            </a:r>
+            <a:r>
+              <a:rPr lang="en-US" sz="3600" dirty="0" smtClean="0"/>
+              <a:t>Live Demo</a:t>
+            </a:r>
+            <a:r>
+              <a:rPr lang="en-US" sz="3600" dirty="0" smtClean="0">
+                <a:solidFill>
+                  <a:srgbClr val="92D050"/>
+                </a:solidFill>
+              </a:rPr>
+              <a:t>}</a:t>
+            </a:r>
+            <a:endParaRPr lang="en-US" sz="3600" dirty="0">
+              <a:solidFill>
+                <a:srgbClr val="92D050"/>
+              </a:solidFill>
+            </a:endParaRPr>
+          </a:p>
+        </p:txBody>
+      </p:sp>
+      <p:sp>
+        <p:nvSpPr>
+          <p:cNvPr id="10" name="TextBox 9"/>
+          <p:cNvSpPr txBox="1"/>
+          <p:nvPr/>
+        </p:nvSpPr>
+        <p:spPr>
+          <a:xfrm>
+            <a:off x="1408754" y="815258"/>
+            <a:ext cx="6771503" cy="369332"/>
+          </a:xfrm>
+          <a:prstGeom prst="rect">
+            <a:avLst/>
+          </a:prstGeom>
+          <a:noFill/>
+        </p:spPr>
+        <p:txBody>
+          <a:bodyPr wrap="square" rtlCol="0">
+            <a:spAutoFit/>
+          </a:bodyPr>
+          <a:lstStyle/>
+          <a:p>
+            <a:r>
+              <a:rPr lang="en-US" dirty="0" smtClean="0"/>
+              <a:t>~ </a:t>
+            </a:r>
+            <a:r>
+              <a:rPr lang="en-US" dirty="0" err="1" smtClean="0"/>
+              <a:t>System.Windows.Controls</a:t>
+            </a:r>
+            <a:endParaRPr lang="en-US" dirty="0" smtClean="0"/>
+          </a:p>
+        </p:txBody>
+      </p:sp>
+      <p:sp>
+        <p:nvSpPr>
+          <p:cNvPr id="8" name="TextBox 7"/>
+          <p:cNvSpPr txBox="1"/>
+          <p:nvPr/>
+        </p:nvSpPr>
+        <p:spPr>
+          <a:xfrm>
+            <a:off x="1306286" y="1968759"/>
+            <a:ext cx="3965510" cy="1477328"/>
+          </a:xfrm>
+          <a:prstGeom prst="rect">
+            <a:avLst/>
+          </a:prstGeom>
+          <a:noFill/>
+        </p:spPr>
+        <p:txBody>
+          <a:bodyPr wrap="square" rtlCol="0">
+            <a:spAutoFit/>
+          </a:bodyPr>
+          <a:lstStyle/>
+          <a:p>
+            <a:r>
+              <a:rPr lang="en-US" dirty="0" smtClean="0"/>
+              <a:t>Clipping</a:t>
+            </a:r>
+          </a:p>
+          <a:p>
+            <a:r>
+              <a:rPr lang="en-US" dirty="0" smtClean="0"/>
+              <a:t>Scrolling</a:t>
+            </a:r>
+            <a:endParaRPr lang="en-US" dirty="0"/>
+          </a:p>
+          <a:p>
+            <a:r>
+              <a:rPr lang="en-US" dirty="0" smtClean="0"/>
+              <a:t>Scaling</a:t>
+            </a:r>
+            <a:endParaRPr lang="en-US" dirty="0"/>
+          </a:p>
+          <a:p>
+            <a:r>
+              <a:rPr lang="en-US" dirty="0" smtClean="0"/>
+              <a:t>Wrapping</a:t>
+            </a:r>
+            <a:endParaRPr lang="en-US" dirty="0"/>
+          </a:p>
+          <a:p>
+            <a:r>
+              <a:rPr lang="en-US" dirty="0" smtClean="0"/>
+              <a:t>Trimming</a:t>
+            </a:r>
+            <a:endParaRPr lang="en-US" dirty="0"/>
+          </a:p>
+        </p:txBody>
+      </p:sp>
+    </p:spTree>
+    <p:extLst>
+      <p:ext uri="{BB962C8B-B14F-4D97-AF65-F5344CB8AC3E}">
+        <p14:creationId xmlns:p14="http://schemas.microsoft.com/office/powerpoint/2010/main" val="1524230498"/>
       </p:ext>
     </p:extLst>
   </p:cSld>
@@ -8566,11 +12326,7 @@
           <a:p>
             <a:r>
               <a:rPr lang="en-US" dirty="0" smtClean="0"/>
-              <a:t>~ </a:t>
-            </a:r>
-            <a:r>
-              <a:rPr lang="en-US" dirty="0" smtClean="0"/>
-              <a:t>WPF Elements tend to size to their content.</a:t>
+              <a:t>~ WPF Elements tend to size to their content.</a:t>
             </a:r>
             <a:endParaRPr lang="en-US" dirty="0"/>
           </a:p>
@@ -8815,7 +12571,6 @@
               <a:rPr lang="en-US" dirty="0" smtClean="0"/>
               <a:t>Calculated during layout, based on child’s properties like Height, Width, etc.</a:t>
             </a:r>
-            <a:endParaRPr lang="en-US" dirty="0" smtClean="0"/>
           </a:p>
           <a:p>
             <a:pPr marL="285750" indent="-285750">
@@ -8838,11 +12593,7 @@
             </a:pPr>
             <a:r>
               <a:rPr lang="en-US" dirty="0" smtClean="0"/>
-              <a:t>Inherited </a:t>
-            </a:r>
-            <a:r>
-              <a:rPr lang="en-US" dirty="0" smtClean="0"/>
-              <a:t>from </a:t>
+              <a:t>Inherited from </a:t>
             </a:r>
             <a:r>
               <a:rPr lang="en-US" dirty="0" err="1" smtClean="0"/>
@@ -11206,11 +14957,7 @@
             </a:r>
             <a:r>
               <a:rPr lang="en-US" dirty="0"/>
-              <a:t> </a:t>
-            </a:r>
-            <a:r>
-              <a:rPr lang="en-US" dirty="0"/>
-              <a:t>support transforms!</a:t>
+              <a:t> support transforms!</a:t>
             </a:r>
           </a:p>
         </p:txBody>

</xml_diff>